<commit_message>
classification and presentation update
</commit_message>
<xml_diff>
--- a/slide/Presentation.pptx
+++ b/slide/Presentation.pptx
@@ -6,7 +6,17 @@
   </p:sldMasterIdLst>
   <p:sldIdLst>
     <p:sldId id="256" r:id="rId2"/>
-    <p:sldId id="257" r:id="rId3"/>
+    <p:sldId id="258" r:id="rId3"/>
+    <p:sldId id="269" r:id="rId4"/>
+    <p:sldId id="270" r:id="rId5"/>
+    <p:sldId id="257" r:id="rId6"/>
+    <p:sldId id="271" r:id="rId7"/>
+    <p:sldId id="259" r:id="rId8"/>
+    <p:sldId id="272" r:id="rId9"/>
+    <p:sldId id="266" r:id="rId10"/>
+    <p:sldId id="261" r:id="rId11"/>
+    <p:sldId id="267" r:id="rId12"/>
+    <p:sldId id="268" r:id="rId13"/>
   </p:sldIdLst>
   <p:sldSz cx="12192000" cy="6858000"/>
   <p:notesSz cx="6858000" cy="9144000"/>
@@ -105,6 +115,11 @@
       </a:defRPr>
     </a:lvl9pPr>
   </p:defaultTextStyle>
+  <p:extLst>
+    <p:ext uri="{EFAFB233-063F-42B5-8137-9DF3F51BA10A}">
+      <p15:sldGuideLst xmlns:p15="http://schemas.microsoft.com/office/powerpoint/2012/main"/>
+    </p:ext>
+  </p:extLst>
 </p:presentation>
 </file>
 
@@ -255,7 +270,7 @@
           <a:p>
             <a:fld id="{D07FF4B3-45DD-4F40-8E3A-937132F6E2AB}" type="datetimeFigureOut">
               <a:rPr lang="en-US" smtClean="0"/>
-              <a:t>5/30/19</a:t>
+              <a:t>6/14/19</a:t>
             </a:fld>
             <a:endParaRPr lang="en-US"/>
           </a:p>
@@ -453,7 +468,7 @@
           <a:p>
             <a:fld id="{D07FF4B3-45DD-4F40-8E3A-937132F6E2AB}" type="datetimeFigureOut">
               <a:rPr lang="en-US" smtClean="0"/>
-              <a:t>5/30/19</a:t>
+              <a:t>6/14/19</a:t>
             </a:fld>
             <a:endParaRPr lang="en-US"/>
           </a:p>
@@ -661,7 +676,7 @@
           <a:p>
             <a:fld id="{D07FF4B3-45DD-4F40-8E3A-937132F6E2AB}" type="datetimeFigureOut">
               <a:rPr lang="en-US" smtClean="0"/>
-              <a:t>5/30/19</a:t>
+              <a:t>6/14/19</a:t>
             </a:fld>
             <a:endParaRPr lang="en-US"/>
           </a:p>
@@ -859,7 +874,7 @@
           <a:p>
             <a:fld id="{D07FF4B3-45DD-4F40-8E3A-937132F6E2AB}" type="datetimeFigureOut">
               <a:rPr lang="en-US" smtClean="0"/>
-              <a:t>5/30/19</a:t>
+              <a:t>6/14/19</a:t>
             </a:fld>
             <a:endParaRPr lang="en-US"/>
           </a:p>
@@ -1134,7 +1149,7 @@
           <a:p>
             <a:fld id="{D07FF4B3-45DD-4F40-8E3A-937132F6E2AB}" type="datetimeFigureOut">
               <a:rPr lang="en-US" smtClean="0"/>
-              <a:t>5/30/19</a:t>
+              <a:t>6/14/19</a:t>
             </a:fld>
             <a:endParaRPr lang="en-US"/>
           </a:p>
@@ -1399,7 +1414,7 @@
           <a:p>
             <a:fld id="{D07FF4B3-45DD-4F40-8E3A-937132F6E2AB}" type="datetimeFigureOut">
               <a:rPr lang="en-US" smtClean="0"/>
-              <a:t>5/30/19</a:t>
+              <a:t>6/14/19</a:t>
             </a:fld>
             <a:endParaRPr lang="en-US"/>
           </a:p>
@@ -1811,7 +1826,7 @@
           <a:p>
             <a:fld id="{D07FF4B3-45DD-4F40-8E3A-937132F6E2AB}" type="datetimeFigureOut">
               <a:rPr lang="en-US" smtClean="0"/>
-              <a:t>5/30/19</a:t>
+              <a:t>6/14/19</a:t>
             </a:fld>
             <a:endParaRPr lang="en-US"/>
           </a:p>
@@ -1952,7 +1967,7 @@
           <a:p>
             <a:fld id="{D07FF4B3-45DD-4F40-8E3A-937132F6E2AB}" type="datetimeFigureOut">
               <a:rPr lang="en-US" smtClean="0"/>
-              <a:t>5/30/19</a:t>
+              <a:t>6/14/19</a:t>
             </a:fld>
             <a:endParaRPr lang="en-US"/>
           </a:p>
@@ -2065,7 +2080,7 @@
           <a:p>
             <a:fld id="{D07FF4B3-45DD-4F40-8E3A-937132F6E2AB}" type="datetimeFigureOut">
               <a:rPr lang="en-US" smtClean="0"/>
-              <a:t>5/30/19</a:t>
+              <a:t>6/14/19</a:t>
             </a:fld>
             <a:endParaRPr lang="en-US"/>
           </a:p>
@@ -2376,7 +2391,7 @@
           <a:p>
             <a:fld id="{D07FF4B3-45DD-4F40-8E3A-937132F6E2AB}" type="datetimeFigureOut">
               <a:rPr lang="en-US" smtClean="0"/>
-              <a:t>5/30/19</a:t>
+              <a:t>6/14/19</a:t>
             </a:fld>
             <a:endParaRPr lang="en-US"/>
           </a:p>
@@ -2664,7 +2679,7 @@
           <a:p>
             <a:fld id="{D07FF4B3-45DD-4F40-8E3A-937132F6E2AB}" type="datetimeFigureOut">
               <a:rPr lang="en-US" smtClean="0"/>
-              <a:t>5/30/19</a:t>
+              <a:t>6/14/19</a:t>
             </a:fld>
             <a:endParaRPr lang="en-US"/>
           </a:p>
@@ -2905,7 +2920,7 @@
           <a:p>
             <a:fld id="{D07FF4B3-45DD-4F40-8E3A-937132F6E2AB}" type="datetimeFigureOut">
               <a:rPr lang="en-US" smtClean="0"/>
-              <a:t>5/30/19</a:t>
+              <a:t>6/14/19</a:t>
             </a:fld>
             <a:endParaRPr lang="en-US"/>
           </a:p>
@@ -3343,7 +3358,17 @@
           <a:bodyPr/>
           <a:lstStyle/>
           <a:p>
-            <a:endParaRPr lang="en-US" dirty="0"/>
+            <a:r>
+              <a:rPr lang="en-US" dirty="0"/>
+              <a:t>Malicious Messages Detector</a:t>
+            </a:r>
+            <a:br>
+              <a:rPr lang="en-US" dirty="0"/>
+            </a:br>
+            <a:r>
+              <a:rPr lang="en-US" dirty="0"/>
+              <a:t>Based on Neural Network </a:t>
+            </a:r>
           </a:p>
         </p:txBody>
       </p:sp>
@@ -3363,12 +3388,41 @@
             <p:ph type="subTitle" idx="1"/>
           </p:nvPr>
         </p:nvSpPr>
-        <p:spPr/>
-        <p:txBody>
-          <a:bodyPr/>
-          <a:lstStyle/>
-          <a:p>
-            <a:endParaRPr lang="en-US"/>
+        <p:spPr>
+          <a:xfrm>
+            <a:off x="1524000" y="4142950"/>
+            <a:ext cx="9144000" cy="1227540"/>
+          </a:xfrm>
+        </p:spPr>
+        <p:txBody>
+          <a:bodyPr>
+            <a:normAutofit fontScale="92500" lnSpcReduction="10000"/>
+          </a:bodyPr>
+          <a:lstStyle/>
+          <a:p>
+            <a:pPr algn="r"/>
+            <a:r>
+              <a:rPr lang="en-US" dirty="0"/>
+              <a:t>Supervisor: Jean-Philippe MONTEUUIS</a:t>
+            </a:r>
+          </a:p>
+          <a:p>
+            <a:pPr algn="r"/>
+            <a:r>
+              <a:rPr lang="en-US" dirty="0" err="1"/>
+              <a:t>Guodong</a:t>
+            </a:r>
+            <a:r>
+              <a:rPr lang="en-US" dirty="0"/>
+              <a:t> SUN </a:t>
+            </a:r>
+          </a:p>
+          <a:p>
+            <a:pPr algn="r"/>
+            <a:r>
+              <a:rPr lang="en-US" dirty="0"/>
+              <a:t>Liang WANG</a:t>
+            </a:r>
           </a:p>
         </p:txBody>
       </p:sp>
@@ -3385,7 +3439,7 @@
 </p:sld>
 </file>
 
-<file path=ppt/slides/slide2.xml><?xml version="1.0" encoding="utf-8"?>
+<file path=ppt/slides/slide10.xml><?xml version="1.0" encoding="utf-8"?>
 <p:sld xmlns:a="http://schemas.openxmlformats.org/drawingml/2006/main" xmlns:r="http://schemas.openxmlformats.org/officeDocument/2006/relationships" xmlns:p="http://schemas.openxmlformats.org/presentationml/2006/main">
   <p:cSld>
     <p:spTree>
@@ -3407,6 +3461,1356 @@
           <p:cNvPr id="2" name="Title 1">
             <a:extLst>
               <a:ext uri="{FF2B5EF4-FFF2-40B4-BE49-F238E27FC236}">
+                <a16:creationId xmlns:a16="http://schemas.microsoft.com/office/drawing/2014/main" id="{D6CE7165-6A53-E24F-9A55-CF234BEB36F0}"/>
+              </a:ext>
+            </a:extLst>
+          </p:cNvPr>
+          <p:cNvSpPr>
+            <a:spLocks noGrp="1"/>
+          </p:cNvSpPr>
+          <p:nvPr>
+            <p:ph type="title"/>
+          </p:nvPr>
+        </p:nvSpPr>
+        <p:spPr/>
+        <p:txBody>
+          <a:bodyPr/>
+          <a:lstStyle/>
+          <a:p>
+            <a:r>
+              <a:rPr lang="en-US" dirty="0"/>
+              <a:t>Classification</a:t>
+            </a:r>
+          </a:p>
+        </p:txBody>
+      </p:sp>
+      <p:graphicFrame>
+        <p:nvGraphicFramePr>
+          <p:cNvPr id="5" name="Content Placeholder 4">
+            <a:extLst>
+              <a:ext uri="{FF2B5EF4-FFF2-40B4-BE49-F238E27FC236}">
+                <a16:creationId xmlns:a16="http://schemas.microsoft.com/office/drawing/2014/main" id="{63D5680F-B747-4646-A314-A11E71E6C500}"/>
+              </a:ext>
+            </a:extLst>
+          </p:cNvPr>
+          <p:cNvGraphicFramePr>
+            <a:graphicFrameLocks noGrp="1"/>
+          </p:cNvGraphicFramePr>
+          <p:nvPr>
+            <p:ph idx="1"/>
+            <p:extLst>
+              <p:ext uri="{D42A27DB-BD31-4B8C-83A1-F6EECF244321}">
+                <p14:modId xmlns:p14="http://schemas.microsoft.com/office/powerpoint/2010/main" val="1950042290"/>
+              </p:ext>
+            </p:extLst>
+          </p:nvPr>
+        </p:nvGraphicFramePr>
+        <p:xfrm>
+          <a:off x="838200" y="1856943"/>
+          <a:ext cx="10785762" cy="2225040"/>
+        </p:xfrm>
+        <a:graphic>
+          <a:graphicData uri="http://schemas.openxmlformats.org/drawingml/2006/table">
+            <a:tbl>
+              <a:tblPr firstRow="1" bandRow="1">
+                <a:tableStyleId>{5C22544A-7EE6-4342-B048-85BDC9FD1C3A}</a:tableStyleId>
+              </a:tblPr>
+              <a:tblGrid>
+                <a:gridCol w="1797627">
+                  <a:extLst>
+                    <a:ext uri="{9D8B030D-6E8A-4147-A177-3AD203B41FA5}">
+                      <a16:colId xmlns:a16="http://schemas.microsoft.com/office/drawing/2014/main" val="2090757540"/>
+                    </a:ext>
+                  </a:extLst>
+                </a:gridCol>
+                <a:gridCol w="1797627">
+                  <a:extLst>
+                    <a:ext uri="{9D8B030D-6E8A-4147-A177-3AD203B41FA5}">
+                      <a16:colId xmlns:a16="http://schemas.microsoft.com/office/drawing/2014/main" val="4042073667"/>
+                    </a:ext>
+                  </a:extLst>
+                </a:gridCol>
+                <a:gridCol w="1797627">
+                  <a:extLst>
+                    <a:ext uri="{9D8B030D-6E8A-4147-A177-3AD203B41FA5}">
+                      <a16:colId xmlns:a16="http://schemas.microsoft.com/office/drawing/2014/main" val="2855456790"/>
+                    </a:ext>
+                  </a:extLst>
+                </a:gridCol>
+                <a:gridCol w="1797627">
+                  <a:extLst>
+                    <a:ext uri="{9D8B030D-6E8A-4147-A177-3AD203B41FA5}">
+                      <a16:colId xmlns:a16="http://schemas.microsoft.com/office/drawing/2014/main" val="1025178159"/>
+                    </a:ext>
+                  </a:extLst>
+                </a:gridCol>
+                <a:gridCol w="1797627">
+                  <a:extLst>
+                    <a:ext uri="{9D8B030D-6E8A-4147-A177-3AD203B41FA5}">
+                      <a16:colId xmlns:a16="http://schemas.microsoft.com/office/drawing/2014/main" val="1798578505"/>
+                    </a:ext>
+                  </a:extLst>
+                </a:gridCol>
+                <a:gridCol w="1797627">
+                  <a:extLst>
+                    <a:ext uri="{9D8B030D-6E8A-4147-A177-3AD203B41FA5}">
+                      <a16:colId xmlns:a16="http://schemas.microsoft.com/office/drawing/2014/main" val="2263264397"/>
+                    </a:ext>
+                  </a:extLst>
+                </a:gridCol>
+              </a:tblGrid>
+              <a:tr h="370840">
+                <a:tc>
+                  <a:txBody>
+                    <a:bodyPr/>
+                    <a:lstStyle/>
+                    <a:p>
+                      <a:endParaRPr lang="en-US" dirty="0"/>
+                    </a:p>
+                  </a:txBody>
+                  <a:tcPr/>
+                </a:tc>
+                <a:tc>
+                  <a:txBody>
+                    <a:bodyPr/>
+                    <a:lstStyle/>
+                    <a:p>
+                      <a:pPr marL="0" marR="0" lvl="0" indent="0" algn="l" defTabSz="914400" rtl="0" eaLnBrk="1" fontAlgn="auto" latinLnBrk="0" hangingPunct="1">
+                        <a:lnSpc>
+                          <a:spcPct val="100000"/>
+                        </a:lnSpc>
+                        <a:spcBef>
+                          <a:spcPts val="0"/>
+                        </a:spcBef>
+                        <a:spcAft>
+                          <a:spcPts val="0"/>
+                        </a:spcAft>
+                        <a:buClrTx/>
+                        <a:buSzTx/>
+                        <a:buFontTx/>
+                        <a:buNone/>
+                        <a:tabLst/>
+                        <a:defRPr/>
+                      </a:pPr>
+                      <a:r>
+                        <a:rPr lang="en-US" dirty="0"/>
+                        <a:t>Type 1 (Predict)</a:t>
+                      </a:r>
+                    </a:p>
+                  </a:txBody>
+                  <a:tcPr/>
+                </a:tc>
+                <a:tc>
+                  <a:txBody>
+                    <a:bodyPr/>
+                    <a:lstStyle/>
+                    <a:p>
+                      <a:pPr marL="0" marR="0" lvl="0" indent="0" algn="l" defTabSz="914400" rtl="0" eaLnBrk="1" fontAlgn="auto" latinLnBrk="0" hangingPunct="1">
+                        <a:lnSpc>
+                          <a:spcPct val="100000"/>
+                        </a:lnSpc>
+                        <a:spcBef>
+                          <a:spcPts val="0"/>
+                        </a:spcBef>
+                        <a:spcAft>
+                          <a:spcPts val="0"/>
+                        </a:spcAft>
+                        <a:buClrTx/>
+                        <a:buSzTx/>
+                        <a:buFontTx/>
+                        <a:buNone/>
+                        <a:tabLst/>
+                        <a:defRPr/>
+                      </a:pPr>
+                      <a:r>
+                        <a:rPr lang="en-US" dirty="0"/>
+                        <a:t>Type 2 (Predict)</a:t>
+                      </a:r>
+                    </a:p>
+                  </a:txBody>
+                  <a:tcPr/>
+                </a:tc>
+                <a:tc>
+                  <a:txBody>
+                    <a:bodyPr/>
+                    <a:lstStyle/>
+                    <a:p>
+                      <a:pPr marL="0" marR="0" lvl="0" indent="0" algn="l" defTabSz="914400" rtl="0" eaLnBrk="1" fontAlgn="auto" latinLnBrk="0" hangingPunct="1">
+                        <a:lnSpc>
+                          <a:spcPct val="100000"/>
+                        </a:lnSpc>
+                        <a:spcBef>
+                          <a:spcPts val="0"/>
+                        </a:spcBef>
+                        <a:spcAft>
+                          <a:spcPts val="0"/>
+                        </a:spcAft>
+                        <a:buClrTx/>
+                        <a:buSzTx/>
+                        <a:buFontTx/>
+                        <a:buNone/>
+                        <a:tabLst/>
+                        <a:defRPr/>
+                      </a:pPr>
+                      <a:r>
+                        <a:rPr lang="en-US" dirty="0"/>
+                        <a:t>Type 4 (Predict)</a:t>
+                      </a:r>
+                    </a:p>
+                  </a:txBody>
+                  <a:tcPr/>
+                </a:tc>
+                <a:tc>
+                  <a:txBody>
+                    <a:bodyPr/>
+                    <a:lstStyle/>
+                    <a:p>
+                      <a:pPr marL="0" marR="0" lvl="0" indent="0" algn="l" defTabSz="914400" rtl="0" eaLnBrk="1" fontAlgn="auto" latinLnBrk="0" hangingPunct="1">
+                        <a:lnSpc>
+                          <a:spcPct val="100000"/>
+                        </a:lnSpc>
+                        <a:spcBef>
+                          <a:spcPts val="0"/>
+                        </a:spcBef>
+                        <a:spcAft>
+                          <a:spcPts val="0"/>
+                        </a:spcAft>
+                        <a:buClrTx/>
+                        <a:buSzTx/>
+                        <a:buFontTx/>
+                        <a:buNone/>
+                        <a:tabLst/>
+                        <a:defRPr/>
+                      </a:pPr>
+                      <a:r>
+                        <a:rPr lang="en-US" dirty="0"/>
+                        <a:t>Type 8 (Predict)</a:t>
+                      </a:r>
+                    </a:p>
+                  </a:txBody>
+                  <a:tcPr/>
+                </a:tc>
+                <a:tc>
+                  <a:txBody>
+                    <a:bodyPr/>
+                    <a:lstStyle/>
+                    <a:p>
+                      <a:pPr marL="0" marR="0" lvl="0" indent="0" algn="l" defTabSz="914400" rtl="0" eaLnBrk="1" fontAlgn="auto" latinLnBrk="0" hangingPunct="1">
+                        <a:lnSpc>
+                          <a:spcPct val="100000"/>
+                        </a:lnSpc>
+                        <a:spcBef>
+                          <a:spcPts val="0"/>
+                        </a:spcBef>
+                        <a:spcAft>
+                          <a:spcPts val="0"/>
+                        </a:spcAft>
+                        <a:buClrTx/>
+                        <a:buSzTx/>
+                        <a:buFontTx/>
+                        <a:buNone/>
+                        <a:tabLst/>
+                        <a:defRPr/>
+                      </a:pPr>
+                      <a:r>
+                        <a:rPr lang="en-US" dirty="0"/>
+                        <a:t>Type 16 (Predict)</a:t>
+                      </a:r>
+                    </a:p>
+                  </a:txBody>
+                  <a:tcPr/>
+                </a:tc>
+                <a:extLst>
+                  <a:ext uri="{0D108BD9-81ED-4DB2-BD59-A6C34878D82A}">
+                    <a16:rowId xmlns:a16="http://schemas.microsoft.com/office/drawing/2014/main" val="1764424682"/>
+                  </a:ext>
+                </a:extLst>
+              </a:tr>
+              <a:tr h="370840">
+                <a:tc>
+                  <a:txBody>
+                    <a:bodyPr/>
+                    <a:lstStyle/>
+                    <a:p>
+                      <a:r>
+                        <a:rPr lang="en-US" dirty="0"/>
+                        <a:t>Type 1 (real)</a:t>
+                      </a:r>
+                    </a:p>
+                  </a:txBody>
+                  <a:tcPr/>
+                </a:tc>
+                <a:tc>
+                  <a:txBody>
+                    <a:bodyPr/>
+                    <a:lstStyle/>
+                    <a:p>
+                      <a:r>
+                        <a:rPr lang="en-US" dirty="0"/>
+                        <a:t>0.7623</a:t>
+                      </a:r>
+                    </a:p>
+                  </a:txBody>
+                  <a:tcPr/>
+                </a:tc>
+                <a:tc>
+                  <a:txBody>
+                    <a:bodyPr/>
+                    <a:lstStyle/>
+                    <a:p>
+                      <a:r>
+                        <a:rPr lang="en-US" dirty="0"/>
+                        <a:t>0.0212</a:t>
+                      </a:r>
+                    </a:p>
+                  </a:txBody>
+                  <a:tcPr/>
+                </a:tc>
+                <a:tc>
+                  <a:txBody>
+                    <a:bodyPr/>
+                    <a:lstStyle/>
+                    <a:p>
+                      <a:r>
+                        <a:rPr lang="en-US" dirty="0"/>
+                        <a:t>0.0779</a:t>
+                      </a:r>
+                    </a:p>
+                  </a:txBody>
+                  <a:tcPr/>
+                </a:tc>
+                <a:tc>
+                  <a:txBody>
+                    <a:bodyPr/>
+                    <a:lstStyle/>
+                    <a:p>
+                      <a:r>
+                        <a:rPr lang="en-US" dirty="0"/>
+                        <a:t>0.0191</a:t>
+                      </a:r>
+                    </a:p>
+                  </a:txBody>
+                  <a:tcPr/>
+                </a:tc>
+                <a:tc>
+                  <a:txBody>
+                    <a:bodyPr/>
+                    <a:lstStyle/>
+                    <a:p>
+                      <a:r>
+                        <a:rPr lang="en-US" dirty="0"/>
+                        <a:t>0.1145</a:t>
+                      </a:r>
+                    </a:p>
+                  </a:txBody>
+                  <a:tcPr/>
+                </a:tc>
+                <a:extLst>
+                  <a:ext uri="{0D108BD9-81ED-4DB2-BD59-A6C34878D82A}">
+                    <a16:rowId xmlns:a16="http://schemas.microsoft.com/office/drawing/2014/main" val="2242517190"/>
+                  </a:ext>
+                </a:extLst>
+              </a:tr>
+              <a:tr h="370840">
+                <a:tc>
+                  <a:txBody>
+                    <a:bodyPr/>
+                    <a:lstStyle/>
+                    <a:p>
+                      <a:pPr marL="0" marR="0" lvl="0" indent="0" algn="l" defTabSz="914400" rtl="0" eaLnBrk="1" fontAlgn="auto" latinLnBrk="0" hangingPunct="1">
+                        <a:lnSpc>
+                          <a:spcPct val="100000"/>
+                        </a:lnSpc>
+                        <a:spcBef>
+                          <a:spcPts val="0"/>
+                        </a:spcBef>
+                        <a:spcAft>
+                          <a:spcPts val="0"/>
+                        </a:spcAft>
+                        <a:buClrTx/>
+                        <a:buSzTx/>
+                        <a:buFontTx/>
+                        <a:buNone/>
+                        <a:tabLst/>
+                        <a:defRPr/>
+                      </a:pPr>
+                      <a:r>
+                        <a:rPr lang="en-US" dirty="0"/>
+                        <a:t>Type 2 (real)</a:t>
+                      </a:r>
+                    </a:p>
+                  </a:txBody>
+                  <a:tcPr/>
+                </a:tc>
+                <a:tc>
+                  <a:txBody>
+                    <a:bodyPr/>
+                    <a:lstStyle/>
+                    <a:p>
+                      <a:r>
+                        <a:rPr lang="en-US" dirty="0"/>
+                        <a:t>0.0016</a:t>
+                      </a:r>
+                    </a:p>
+                  </a:txBody>
+                  <a:tcPr/>
+                </a:tc>
+                <a:tc>
+                  <a:txBody>
+                    <a:bodyPr/>
+                    <a:lstStyle/>
+                    <a:p>
+                      <a:r>
+                        <a:rPr lang="en-US" dirty="0"/>
+                        <a:t>0.9401</a:t>
+                      </a:r>
+                    </a:p>
+                  </a:txBody>
+                  <a:tcPr/>
+                </a:tc>
+                <a:tc>
+                  <a:txBody>
+                    <a:bodyPr/>
+                    <a:lstStyle/>
+                    <a:p>
+                      <a:r>
+                        <a:rPr lang="en-US" dirty="0"/>
+                        <a:t>0.0096</a:t>
+                      </a:r>
+                    </a:p>
+                  </a:txBody>
+                  <a:tcPr/>
+                </a:tc>
+                <a:tc>
+                  <a:txBody>
+                    <a:bodyPr/>
+                    <a:lstStyle/>
+                    <a:p>
+                      <a:r>
+                        <a:rPr lang="en-US" dirty="0"/>
+                        <a:t>0.0444</a:t>
+                      </a:r>
+                    </a:p>
+                  </a:txBody>
+                  <a:tcPr/>
+                </a:tc>
+                <a:tc>
+                  <a:txBody>
+                    <a:bodyPr/>
+                    <a:lstStyle/>
+                    <a:p>
+                      <a:r>
+                        <a:rPr lang="en-US" dirty="0"/>
+                        <a:t>0.0043</a:t>
+                      </a:r>
+                    </a:p>
+                  </a:txBody>
+                  <a:tcPr/>
+                </a:tc>
+                <a:extLst>
+                  <a:ext uri="{0D108BD9-81ED-4DB2-BD59-A6C34878D82A}">
+                    <a16:rowId xmlns:a16="http://schemas.microsoft.com/office/drawing/2014/main" val="2137770293"/>
+                  </a:ext>
+                </a:extLst>
+              </a:tr>
+              <a:tr h="370840">
+                <a:tc>
+                  <a:txBody>
+                    <a:bodyPr/>
+                    <a:lstStyle/>
+                    <a:p>
+                      <a:pPr marL="0" marR="0" lvl="0" indent="0" algn="l" defTabSz="914400" rtl="0" eaLnBrk="1" fontAlgn="auto" latinLnBrk="0" hangingPunct="1">
+                        <a:lnSpc>
+                          <a:spcPct val="100000"/>
+                        </a:lnSpc>
+                        <a:spcBef>
+                          <a:spcPts val="0"/>
+                        </a:spcBef>
+                        <a:spcAft>
+                          <a:spcPts val="0"/>
+                        </a:spcAft>
+                        <a:buClrTx/>
+                        <a:buSzTx/>
+                        <a:buFontTx/>
+                        <a:buNone/>
+                        <a:tabLst/>
+                        <a:defRPr/>
+                      </a:pPr>
+                      <a:r>
+                        <a:rPr lang="en-US" dirty="0"/>
+                        <a:t>Type 4 (real)</a:t>
+                      </a:r>
+                    </a:p>
+                  </a:txBody>
+                  <a:tcPr/>
+                </a:tc>
+                <a:tc>
+                  <a:txBody>
+                    <a:bodyPr/>
+                    <a:lstStyle/>
+                    <a:p>
+                      <a:r>
+                        <a:rPr lang="en-US" dirty="0"/>
+                        <a:t>0.0005</a:t>
+                      </a:r>
+                    </a:p>
+                  </a:txBody>
+                  <a:tcPr/>
+                </a:tc>
+                <a:tc>
+                  <a:txBody>
+                    <a:bodyPr/>
+                    <a:lstStyle/>
+                    <a:p>
+                      <a:r>
+                        <a:rPr lang="en-US" dirty="0"/>
+                        <a:t>0</a:t>
+                      </a:r>
+                    </a:p>
+                  </a:txBody>
+                  <a:tcPr/>
+                </a:tc>
+                <a:tc>
+                  <a:txBody>
+                    <a:bodyPr/>
+                    <a:lstStyle/>
+                    <a:p>
+                      <a:r>
+                        <a:rPr lang="en-US" dirty="0"/>
+                        <a:t>0.9909</a:t>
+                      </a:r>
+                    </a:p>
+                  </a:txBody>
+                  <a:tcPr/>
+                </a:tc>
+                <a:tc>
+                  <a:txBody>
+                    <a:bodyPr/>
+                    <a:lstStyle/>
+                    <a:p>
+                      <a:r>
+                        <a:rPr lang="en-US" dirty="0"/>
+                        <a:t>0.0068</a:t>
+                      </a:r>
+                    </a:p>
+                  </a:txBody>
+                  <a:tcPr/>
+                </a:tc>
+                <a:tc>
+                  <a:txBody>
+                    <a:bodyPr/>
+                    <a:lstStyle/>
+                    <a:p>
+                      <a:r>
+                        <a:rPr lang="en-US" dirty="0"/>
+                        <a:t>0.0018</a:t>
+                      </a:r>
+                    </a:p>
+                  </a:txBody>
+                  <a:tcPr/>
+                </a:tc>
+                <a:extLst>
+                  <a:ext uri="{0D108BD9-81ED-4DB2-BD59-A6C34878D82A}">
+                    <a16:rowId xmlns:a16="http://schemas.microsoft.com/office/drawing/2014/main" val="3090832011"/>
+                  </a:ext>
+                </a:extLst>
+              </a:tr>
+              <a:tr h="370840">
+                <a:tc>
+                  <a:txBody>
+                    <a:bodyPr/>
+                    <a:lstStyle/>
+                    <a:p>
+                      <a:pPr marL="0" marR="0" lvl="0" indent="0" algn="l" defTabSz="914400" rtl="0" eaLnBrk="1" fontAlgn="auto" latinLnBrk="0" hangingPunct="1">
+                        <a:lnSpc>
+                          <a:spcPct val="100000"/>
+                        </a:lnSpc>
+                        <a:spcBef>
+                          <a:spcPts val="0"/>
+                        </a:spcBef>
+                        <a:spcAft>
+                          <a:spcPts val="0"/>
+                        </a:spcAft>
+                        <a:buClrTx/>
+                        <a:buSzTx/>
+                        <a:buFontTx/>
+                        <a:buNone/>
+                        <a:tabLst/>
+                        <a:defRPr/>
+                      </a:pPr>
+                      <a:r>
+                        <a:rPr lang="en-US" dirty="0"/>
+                        <a:t>Type 8 (real)</a:t>
+                      </a:r>
+                    </a:p>
+                  </a:txBody>
+                  <a:tcPr/>
+                </a:tc>
+                <a:tc>
+                  <a:txBody>
+                    <a:bodyPr/>
+                    <a:lstStyle/>
+                    <a:p>
+                      <a:r>
+                        <a:rPr lang="en-US" dirty="0"/>
+                        <a:t>0</a:t>
+                      </a:r>
+                    </a:p>
+                  </a:txBody>
+                  <a:tcPr/>
+                </a:tc>
+                <a:tc>
+                  <a:txBody>
+                    <a:bodyPr/>
+                    <a:lstStyle/>
+                    <a:p>
+                      <a:r>
+                        <a:rPr lang="en-US" dirty="0"/>
+                        <a:t>0.0458</a:t>
+                      </a:r>
+                    </a:p>
+                  </a:txBody>
+                  <a:tcPr/>
+                </a:tc>
+                <a:tc>
+                  <a:txBody>
+                    <a:bodyPr/>
+                    <a:lstStyle/>
+                    <a:p>
+                      <a:r>
+                        <a:rPr lang="en-US" dirty="0"/>
+                        <a:t>0.0040</a:t>
+                      </a:r>
+                    </a:p>
+                  </a:txBody>
+                  <a:tcPr/>
+                </a:tc>
+                <a:tc>
+                  <a:txBody>
+                    <a:bodyPr/>
+                    <a:lstStyle/>
+                    <a:p>
+                      <a:r>
+                        <a:rPr lang="en-US" dirty="0"/>
+                        <a:t>0.9259</a:t>
+                      </a:r>
+                    </a:p>
+                  </a:txBody>
+                  <a:tcPr/>
+                </a:tc>
+                <a:tc>
+                  <a:txBody>
+                    <a:bodyPr/>
+                    <a:lstStyle/>
+                    <a:p>
+                      <a:r>
+                        <a:rPr lang="en-US" dirty="0"/>
+                        <a:t>0.0243</a:t>
+                      </a:r>
+                    </a:p>
+                  </a:txBody>
+                  <a:tcPr/>
+                </a:tc>
+                <a:extLst>
+                  <a:ext uri="{0D108BD9-81ED-4DB2-BD59-A6C34878D82A}">
+                    <a16:rowId xmlns:a16="http://schemas.microsoft.com/office/drawing/2014/main" val="1213682038"/>
+                  </a:ext>
+                </a:extLst>
+              </a:tr>
+              <a:tr h="370840">
+                <a:tc>
+                  <a:txBody>
+                    <a:bodyPr/>
+                    <a:lstStyle/>
+                    <a:p>
+                      <a:pPr marL="0" marR="0" lvl="0" indent="0" algn="l" defTabSz="914400" rtl="0" eaLnBrk="1" fontAlgn="auto" latinLnBrk="0" hangingPunct="1">
+                        <a:lnSpc>
+                          <a:spcPct val="100000"/>
+                        </a:lnSpc>
+                        <a:spcBef>
+                          <a:spcPts val="0"/>
+                        </a:spcBef>
+                        <a:spcAft>
+                          <a:spcPts val="0"/>
+                        </a:spcAft>
+                        <a:buClrTx/>
+                        <a:buSzTx/>
+                        <a:buFontTx/>
+                        <a:buNone/>
+                        <a:tabLst/>
+                        <a:defRPr/>
+                      </a:pPr>
+                      <a:r>
+                        <a:rPr lang="en-US" dirty="0"/>
+                        <a:t>Type 16 (real)</a:t>
+                      </a:r>
+                    </a:p>
+                  </a:txBody>
+                  <a:tcPr/>
+                </a:tc>
+                <a:tc>
+                  <a:txBody>
+                    <a:bodyPr/>
+                    <a:lstStyle/>
+                    <a:p>
+                      <a:r>
+                        <a:rPr lang="en-US" dirty="0"/>
+                        <a:t>0.2707</a:t>
+                      </a:r>
+                    </a:p>
+                  </a:txBody>
+                  <a:tcPr/>
+                </a:tc>
+                <a:tc>
+                  <a:txBody>
+                    <a:bodyPr/>
+                    <a:lstStyle/>
+                    <a:p>
+                      <a:r>
+                        <a:rPr lang="en-US" dirty="0"/>
+                        <a:t>0.0620</a:t>
+                      </a:r>
+                    </a:p>
+                  </a:txBody>
+                  <a:tcPr/>
+                </a:tc>
+                <a:tc>
+                  <a:txBody>
+                    <a:bodyPr/>
+                    <a:lstStyle/>
+                    <a:p>
+                      <a:r>
+                        <a:rPr lang="en-US" dirty="0"/>
+                        <a:t>0.0344</a:t>
+                      </a:r>
+                    </a:p>
+                  </a:txBody>
+                  <a:tcPr/>
+                </a:tc>
+                <a:tc>
+                  <a:txBody>
+                    <a:bodyPr/>
+                    <a:lstStyle/>
+                    <a:p>
+                      <a:r>
+                        <a:rPr lang="en-US" dirty="0"/>
+                        <a:t>0.0450</a:t>
+                      </a:r>
+                    </a:p>
+                  </a:txBody>
+                  <a:tcPr/>
+                </a:tc>
+                <a:tc>
+                  <a:txBody>
+                    <a:bodyPr/>
+                    <a:lstStyle/>
+                    <a:p>
+                      <a:r>
+                        <a:rPr lang="en-US" dirty="0"/>
+                        <a:t>0.5879</a:t>
+                      </a:r>
+                    </a:p>
+                  </a:txBody>
+                  <a:tcPr/>
+                </a:tc>
+                <a:extLst>
+                  <a:ext uri="{0D108BD9-81ED-4DB2-BD59-A6C34878D82A}">
+                    <a16:rowId xmlns:a16="http://schemas.microsoft.com/office/drawing/2014/main" val="2781591634"/>
+                  </a:ext>
+                </a:extLst>
+              </a:tr>
+            </a:tbl>
+          </a:graphicData>
+        </a:graphic>
+      </p:graphicFrame>
+      <p:sp>
+        <p:nvSpPr>
+          <p:cNvPr id="7" name="TextBox 6">
+            <a:extLst>
+              <a:ext uri="{FF2B5EF4-FFF2-40B4-BE49-F238E27FC236}">
+                <a16:creationId xmlns:a16="http://schemas.microsoft.com/office/drawing/2014/main" id="{42499346-6A79-094F-BA36-20157F029ECC}"/>
+              </a:ext>
+            </a:extLst>
+          </p:cNvPr>
+          <p:cNvSpPr txBox="1"/>
+          <p:nvPr/>
+        </p:nvSpPr>
+        <p:spPr>
+          <a:xfrm>
+            <a:off x="838200" y="4520981"/>
+            <a:ext cx="9812494" cy="646331"/>
+          </a:xfrm>
+          <a:prstGeom prst="rect">
+            <a:avLst/>
+          </a:prstGeom>
+          <a:noFill/>
+        </p:spPr>
+        <p:txBody>
+          <a:bodyPr wrap="none" rtlCol="0">
+            <a:spAutoFit/>
+          </a:bodyPr>
+          <a:lstStyle/>
+          <a:p>
+            <a:r>
+              <a:rPr lang="en-US" dirty="0"/>
+              <a:t>***Note that it is invalid for Type 2 attacker, because the first step, i.e. identifying whether the session </a:t>
+            </a:r>
+          </a:p>
+          <a:p>
+            <a:r>
+              <a:rPr lang="en-US" dirty="0"/>
+              <a:t>is malicious or does not  success. </a:t>
+            </a:r>
+          </a:p>
+        </p:txBody>
+      </p:sp>
+    </p:spTree>
+    <p:extLst>
+      <p:ext uri="{BB962C8B-B14F-4D97-AF65-F5344CB8AC3E}">
+        <p14:creationId xmlns:p14="http://schemas.microsoft.com/office/powerpoint/2010/main" val="1020537156"/>
+      </p:ext>
+    </p:extLst>
+  </p:cSld>
+  <p:clrMapOvr>
+    <a:masterClrMapping/>
+  </p:clrMapOvr>
+</p:sld>
+</file>
+
+<file path=ppt/slides/slide11.xml><?xml version="1.0" encoding="utf-8"?>
+<p:sld xmlns:a="http://schemas.openxmlformats.org/drawingml/2006/main" xmlns:r="http://schemas.openxmlformats.org/officeDocument/2006/relationships" xmlns:p="http://schemas.openxmlformats.org/presentationml/2006/main">
+  <p:cSld>
+    <p:spTree>
+      <p:nvGrpSpPr>
+        <p:cNvPr id="1" name=""/>
+        <p:cNvGrpSpPr/>
+        <p:nvPr/>
+      </p:nvGrpSpPr>
+      <p:grpSpPr>
+        <a:xfrm>
+          <a:off x="0" y="0"/>
+          <a:ext cx="0" cy="0"/>
+          <a:chOff x="0" y="0"/>
+          <a:chExt cx="0" cy="0"/>
+        </a:xfrm>
+      </p:grpSpPr>
+      <p:sp>
+        <p:nvSpPr>
+          <p:cNvPr id="2" name="Title 1">
+            <a:extLst>
+              <a:ext uri="{FF2B5EF4-FFF2-40B4-BE49-F238E27FC236}">
+                <a16:creationId xmlns:a16="http://schemas.microsoft.com/office/drawing/2014/main" id="{E65B93E5-C943-CA4B-891E-D024B72760FD}"/>
+              </a:ext>
+            </a:extLst>
+          </p:cNvPr>
+          <p:cNvSpPr>
+            <a:spLocks noGrp="1"/>
+          </p:cNvSpPr>
+          <p:nvPr>
+            <p:ph type="title"/>
+          </p:nvPr>
+        </p:nvSpPr>
+        <p:spPr/>
+        <p:txBody>
+          <a:bodyPr/>
+          <a:lstStyle/>
+          <a:p>
+            <a:r>
+              <a:rPr lang="en-US" dirty="0"/>
+              <a:t>Test:</a:t>
+            </a:r>
+          </a:p>
+        </p:txBody>
+      </p:sp>
+      <p:sp>
+        <p:nvSpPr>
+          <p:cNvPr id="3" name="Content Placeholder 2">
+            <a:extLst>
+              <a:ext uri="{FF2B5EF4-FFF2-40B4-BE49-F238E27FC236}">
+                <a16:creationId xmlns:a16="http://schemas.microsoft.com/office/drawing/2014/main" id="{DE9F8E12-2248-434C-B811-EC982D3D26FF}"/>
+              </a:ext>
+            </a:extLst>
+          </p:cNvPr>
+          <p:cNvSpPr>
+            <a:spLocks noGrp="1"/>
+          </p:cNvSpPr>
+          <p:nvPr>
+            <p:ph idx="1"/>
+          </p:nvPr>
+        </p:nvSpPr>
+        <p:spPr/>
+        <p:txBody>
+          <a:bodyPr/>
+          <a:lstStyle/>
+          <a:p>
+            <a:endParaRPr lang="en-US"/>
+          </a:p>
+        </p:txBody>
+      </p:sp>
+    </p:spTree>
+    <p:extLst>
+      <p:ext uri="{BB962C8B-B14F-4D97-AF65-F5344CB8AC3E}">
+        <p14:creationId xmlns:p14="http://schemas.microsoft.com/office/powerpoint/2010/main" val="1964215436"/>
+      </p:ext>
+    </p:extLst>
+  </p:cSld>
+  <p:clrMapOvr>
+    <a:masterClrMapping/>
+  </p:clrMapOvr>
+</p:sld>
+</file>
+
+<file path=ppt/slides/slide12.xml><?xml version="1.0" encoding="utf-8"?>
+<p:sld xmlns:a="http://schemas.openxmlformats.org/drawingml/2006/main" xmlns:r="http://schemas.openxmlformats.org/officeDocument/2006/relationships" xmlns:p="http://schemas.openxmlformats.org/presentationml/2006/main">
+  <p:cSld>
+    <p:spTree>
+      <p:nvGrpSpPr>
+        <p:cNvPr id="1" name=""/>
+        <p:cNvGrpSpPr/>
+        <p:nvPr/>
+      </p:nvGrpSpPr>
+      <p:grpSpPr>
+        <a:xfrm>
+          <a:off x="0" y="0"/>
+          <a:ext cx="0" cy="0"/>
+          <a:chOff x="0" y="0"/>
+          <a:chExt cx="0" cy="0"/>
+        </a:xfrm>
+      </p:grpSpPr>
+      <p:sp>
+        <p:nvSpPr>
+          <p:cNvPr id="2" name="Title 1">
+            <a:extLst>
+              <a:ext uri="{FF2B5EF4-FFF2-40B4-BE49-F238E27FC236}">
+                <a16:creationId xmlns:a16="http://schemas.microsoft.com/office/drawing/2014/main" id="{6D07E9D9-4BA8-814F-A29F-297191BB7BE2}"/>
+              </a:ext>
+            </a:extLst>
+          </p:cNvPr>
+          <p:cNvSpPr>
+            <a:spLocks noGrp="1"/>
+          </p:cNvSpPr>
+          <p:nvPr>
+            <p:ph type="title"/>
+          </p:nvPr>
+        </p:nvSpPr>
+        <p:spPr/>
+        <p:txBody>
+          <a:bodyPr/>
+          <a:lstStyle/>
+          <a:p>
+            <a:pPr algn="ctr"/>
+            <a:r>
+              <a:rPr lang="en-US" dirty="0"/>
+              <a:t>Thanks!</a:t>
+            </a:r>
+          </a:p>
+        </p:txBody>
+      </p:sp>
+      <p:sp>
+        <p:nvSpPr>
+          <p:cNvPr id="3" name="Text Placeholder 2">
+            <a:extLst>
+              <a:ext uri="{FF2B5EF4-FFF2-40B4-BE49-F238E27FC236}">
+                <a16:creationId xmlns:a16="http://schemas.microsoft.com/office/drawing/2014/main" id="{BC1EFE34-9040-7540-9753-1FD177A0913A}"/>
+              </a:ext>
+            </a:extLst>
+          </p:cNvPr>
+          <p:cNvSpPr>
+            <a:spLocks noGrp="1"/>
+          </p:cNvSpPr>
+          <p:nvPr>
+            <p:ph type="body" idx="1"/>
+          </p:nvPr>
+        </p:nvSpPr>
+        <p:spPr/>
+        <p:txBody>
+          <a:bodyPr/>
+          <a:lstStyle/>
+          <a:p>
+            <a:endParaRPr lang="en-US"/>
+          </a:p>
+        </p:txBody>
+      </p:sp>
+    </p:spTree>
+    <p:extLst>
+      <p:ext uri="{BB962C8B-B14F-4D97-AF65-F5344CB8AC3E}">
+        <p14:creationId xmlns:p14="http://schemas.microsoft.com/office/powerpoint/2010/main" val="2947997667"/>
+      </p:ext>
+    </p:extLst>
+  </p:cSld>
+  <p:clrMapOvr>
+    <a:masterClrMapping/>
+  </p:clrMapOvr>
+</p:sld>
+</file>
+
+<file path=ppt/slides/slide2.xml><?xml version="1.0" encoding="utf-8"?>
+<p:sld xmlns:a="http://schemas.openxmlformats.org/drawingml/2006/main" xmlns:r="http://schemas.openxmlformats.org/officeDocument/2006/relationships" xmlns:p="http://schemas.openxmlformats.org/presentationml/2006/main">
+  <p:cSld>
+    <p:bg>
+      <p:bgPr>
+        <a:solidFill>
+          <a:schemeClr val="bg1"/>
+        </a:solidFill>
+        <a:effectLst/>
+      </p:bgPr>
+    </p:bg>
+    <p:spTree>
+      <p:nvGrpSpPr>
+        <p:cNvPr id="1" name=""/>
+        <p:cNvGrpSpPr/>
+        <p:nvPr/>
+      </p:nvGrpSpPr>
+      <p:grpSpPr>
+        <a:xfrm>
+          <a:off x="0" y="0"/>
+          <a:ext cx="0" cy="0"/>
+          <a:chOff x="0" y="0"/>
+          <a:chExt cx="0" cy="0"/>
+        </a:xfrm>
+      </p:grpSpPr>
+      <p:sp>
+        <p:nvSpPr>
+          <p:cNvPr id="23" name="Rectangle 22">
+            <a:extLst>
+              <a:ext uri="{FF2B5EF4-FFF2-40B4-BE49-F238E27FC236}">
+                <a16:creationId xmlns:a16="http://schemas.microsoft.com/office/drawing/2014/main" id="{A4AC5506-6312-4701-8D3C-40187889A947}"/>
+              </a:ext>
+              <a:ext uri="{C183D7F6-B498-43B3-948B-1728B52AA6E4}">
+                <adec:decorative xmlns:adec="http://schemas.microsoft.com/office/drawing/2017/decorative" val="1"/>
+              </a:ext>
+            </a:extLst>
+          </p:cNvPr>
+          <p:cNvSpPr>
+            <a:spLocks noGrp="1" noRot="1" noChangeAspect="1" noMove="1" noResize="1" noEditPoints="1" noAdjustHandles="1" noChangeArrowheads="1" noChangeShapeType="1" noTextEdit="1"/>
+          </p:cNvSpPr>
+          <p:nvPr>
+            <p:extLst>
+              <p:ext uri="{386F3935-93C4-4BCD-93E2-E3B085C9AB24}">
+                <p16:designElem xmlns:p16="http://schemas.microsoft.com/office/powerpoint/2015/main" val="1"/>
+              </p:ext>
+            </p:extLst>
+          </p:nvPr>
+        </p:nvSpPr>
+        <p:spPr>
+          <a:xfrm>
+            <a:off x="0" y="651752"/>
+            <a:ext cx="12192000" cy="736551"/>
+          </a:xfrm>
+          <a:prstGeom prst="rect">
+            <a:avLst/>
+          </a:prstGeom>
+          <a:solidFill>
+            <a:schemeClr val="tx1"/>
+          </a:solidFill>
+          <a:ln>
+            <a:noFill/>
+          </a:ln>
+        </p:spPr>
+        <p:style>
+          <a:lnRef idx="2">
+            <a:schemeClr val="accent1">
+              <a:shade val="50000"/>
+            </a:schemeClr>
+          </a:lnRef>
+          <a:fillRef idx="1">
+            <a:schemeClr val="accent1"/>
+          </a:fillRef>
+          <a:effectRef idx="0">
+            <a:schemeClr val="accent1"/>
+          </a:effectRef>
+          <a:fontRef idx="minor">
+            <a:schemeClr val="lt1"/>
+          </a:fontRef>
+        </p:style>
+        <p:txBody>
+          <a:bodyPr rtlCol="0" anchor="ctr"/>
+          <a:lstStyle/>
+          <a:p>
+            <a:pPr algn="ctr"/>
+            <a:endParaRPr lang="en-US"/>
+          </a:p>
+        </p:txBody>
+      </p:sp>
+      <p:sp>
+        <p:nvSpPr>
+          <p:cNvPr id="2" name="Title 1">
+            <a:extLst>
+              <a:ext uri="{FF2B5EF4-FFF2-40B4-BE49-F238E27FC236}">
+                <a16:creationId xmlns:a16="http://schemas.microsoft.com/office/drawing/2014/main" id="{86A61CA4-CA32-2B43-A355-410FEF2807A2}"/>
+              </a:ext>
+            </a:extLst>
+          </p:cNvPr>
+          <p:cNvSpPr>
+            <a:spLocks noGrp="1"/>
+          </p:cNvSpPr>
+          <p:nvPr>
+            <p:ph type="title"/>
+          </p:nvPr>
+        </p:nvSpPr>
+        <p:spPr>
+          <a:xfrm>
+            <a:off x="556532" y="643467"/>
+            <a:ext cx="11210925" cy="744836"/>
+          </a:xfrm>
+          <a:prstGeom prst="ellipse">
+            <a:avLst/>
+          </a:prstGeom>
+        </p:spPr>
+        <p:txBody>
+          <a:bodyPr vert="horz" lIns="91440" tIns="45720" rIns="91440" bIns="45720" rtlCol="0" anchor="ctr">
+            <a:normAutofit/>
+          </a:bodyPr>
+          <a:lstStyle/>
+          <a:p>
+            <a:pPr algn="ctr"/>
+            <a:r>
+              <a:rPr lang="en-US" sz="3000" kern="1200">
+                <a:solidFill>
+                  <a:schemeClr val="bg1"/>
+                </a:solidFill>
+                <a:latin typeface="+mj-lt"/>
+                <a:ea typeface="+mj-ea"/>
+                <a:cs typeface="+mj-cs"/>
+              </a:rPr>
+              <a:t>The datasets</a:t>
+            </a:r>
+          </a:p>
+        </p:txBody>
+      </p:sp>
+      <p:pic>
+        <p:nvPicPr>
+          <p:cNvPr id="17" name="Content Placeholder 16" descr="A screenshot of a cell phone&#10;&#10;Description automatically generated">
+            <a:extLst>
+              <a:ext uri="{FF2B5EF4-FFF2-40B4-BE49-F238E27FC236}">
+                <a16:creationId xmlns:a16="http://schemas.microsoft.com/office/drawing/2014/main" id="{058A42E1-D0F3-B44F-96E2-02C07F2531CF}"/>
+              </a:ext>
+            </a:extLst>
+          </p:cNvPr>
+          <p:cNvPicPr>
+            <a:picLocks noGrp="1" noChangeAspect="1"/>
+          </p:cNvPicPr>
+          <p:nvPr>
+            <p:ph idx="1"/>
+          </p:nvPr>
+        </p:nvPicPr>
+        <p:blipFill>
+          <a:blip r:embed="rId2"/>
+          <a:stretch>
+            <a:fillRect/>
+          </a:stretch>
+        </p:blipFill>
+        <p:spPr>
+          <a:xfrm>
+            <a:off x="643467" y="2113885"/>
+            <a:ext cx="10905066" cy="3516883"/>
+          </a:xfrm>
+          <a:prstGeom prst="rect">
+            <a:avLst/>
+          </a:prstGeom>
+        </p:spPr>
+      </p:pic>
+    </p:spTree>
+    <p:extLst>
+      <p:ext uri="{BB962C8B-B14F-4D97-AF65-F5344CB8AC3E}">
+        <p14:creationId xmlns:p14="http://schemas.microsoft.com/office/powerpoint/2010/main" val="3021036977"/>
+      </p:ext>
+    </p:extLst>
+  </p:cSld>
+  <p:clrMapOvr>
+    <a:masterClrMapping/>
+  </p:clrMapOvr>
+</p:sld>
+</file>
+
+<file path=ppt/slides/slide3.xml><?xml version="1.0" encoding="utf-8"?>
+<p:sld xmlns:a="http://schemas.openxmlformats.org/drawingml/2006/main" xmlns:r="http://schemas.openxmlformats.org/officeDocument/2006/relationships" xmlns:p="http://schemas.openxmlformats.org/presentationml/2006/main">
+  <p:cSld>
+    <p:spTree>
+      <p:nvGrpSpPr>
+        <p:cNvPr id="1" name=""/>
+        <p:cNvGrpSpPr/>
+        <p:nvPr/>
+      </p:nvGrpSpPr>
+      <p:grpSpPr>
+        <a:xfrm>
+          <a:off x="0" y="0"/>
+          <a:ext cx="0" cy="0"/>
+          <a:chOff x="0" y="0"/>
+          <a:chExt cx="0" cy="0"/>
+        </a:xfrm>
+      </p:grpSpPr>
+      <p:sp>
+        <p:nvSpPr>
+          <p:cNvPr id="2" name="Title 1">
+            <a:extLst>
+              <a:ext uri="{FF2B5EF4-FFF2-40B4-BE49-F238E27FC236}">
+                <a16:creationId xmlns:a16="http://schemas.microsoft.com/office/drawing/2014/main" id="{C4525B2D-1AE4-8147-817F-B69B98C3CF68}"/>
+              </a:ext>
+            </a:extLst>
+          </p:cNvPr>
+          <p:cNvSpPr>
+            <a:spLocks noGrp="1"/>
+          </p:cNvSpPr>
+          <p:nvPr>
+            <p:ph type="title"/>
+          </p:nvPr>
+        </p:nvSpPr>
+        <p:spPr/>
+        <p:txBody>
+          <a:bodyPr/>
+          <a:lstStyle/>
+          <a:p>
+            <a:r>
+              <a:rPr lang="en-US" dirty="0"/>
+              <a:t>Statistics</a:t>
+            </a:r>
+          </a:p>
+        </p:txBody>
+      </p:sp>
+      <p:sp>
+        <p:nvSpPr>
+          <p:cNvPr id="3" name="Content Placeholder 2">
+            <a:extLst>
+              <a:ext uri="{FF2B5EF4-FFF2-40B4-BE49-F238E27FC236}">
+                <a16:creationId xmlns:a16="http://schemas.microsoft.com/office/drawing/2014/main" id="{076BE82A-1704-184B-A361-9AD6D1BF9837}"/>
+              </a:ext>
+            </a:extLst>
+          </p:cNvPr>
+          <p:cNvSpPr>
+            <a:spLocks noGrp="1"/>
+          </p:cNvSpPr>
+          <p:nvPr>
+            <p:ph idx="1"/>
+          </p:nvPr>
+        </p:nvSpPr>
+        <p:spPr/>
+        <p:txBody>
+          <a:bodyPr/>
+          <a:lstStyle/>
+          <a:p>
+            <a:endParaRPr lang="en-US"/>
+          </a:p>
+        </p:txBody>
+      </p:sp>
+    </p:spTree>
+    <p:extLst>
+      <p:ext uri="{BB962C8B-B14F-4D97-AF65-F5344CB8AC3E}">
+        <p14:creationId xmlns:p14="http://schemas.microsoft.com/office/powerpoint/2010/main" val="410486999"/>
+      </p:ext>
+    </p:extLst>
+  </p:cSld>
+  <p:clrMapOvr>
+    <a:masterClrMapping/>
+  </p:clrMapOvr>
+</p:sld>
+</file>
+
+<file path=ppt/slides/slide4.xml><?xml version="1.0" encoding="utf-8"?>
+<p:sld xmlns:a="http://schemas.openxmlformats.org/drawingml/2006/main" xmlns:r="http://schemas.openxmlformats.org/officeDocument/2006/relationships" xmlns:p="http://schemas.openxmlformats.org/presentationml/2006/main">
+  <p:cSld>
+    <p:spTree>
+      <p:nvGrpSpPr>
+        <p:cNvPr id="1" name=""/>
+        <p:cNvGrpSpPr/>
+        <p:nvPr/>
+      </p:nvGrpSpPr>
+      <p:grpSpPr>
+        <a:xfrm>
+          <a:off x="0" y="0"/>
+          <a:ext cx="0" cy="0"/>
+          <a:chOff x="0" y="0"/>
+          <a:chExt cx="0" cy="0"/>
+        </a:xfrm>
+      </p:grpSpPr>
+      <p:sp>
+        <p:nvSpPr>
+          <p:cNvPr id="2" name="Title 1">
+            <a:extLst>
+              <a:ext uri="{FF2B5EF4-FFF2-40B4-BE49-F238E27FC236}">
+                <a16:creationId xmlns:a16="http://schemas.microsoft.com/office/drawing/2014/main" id="{48E64AE3-32FC-514A-B5AA-3F74913B722E}"/>
+              </a:ext>
+            </a:extLst>
+          </p:cNvPr>
+          <p:cNvSpPr>
+            <a:spLocks noGrp="1"/>
+          </p:cNvSpPr>
+          <p:nvPr>
+            <p:ph type="title"/>
+          </p:nvPr>
+        </p:nvSpPr>
+        <p:spPr/>
+        <p:txBody>
+          <a:bodyPr/>
+          <a:lstStyle/>
+          <a:p>
+            <a:r>
+              <a:rPr lang="en-US" dirty="0"/>
+              <a:t>Attackers </a:t>
+            </a:r>
+          </a:p>
+        </p:txBody>
+      </p:sp>
+      <p:sp>
+        <p:nvSpPr>
+          <p:cNvPr id="3" name="Content Placeholder 2">
+            <a:extLst>
+              <a:ext uri="{FF2B5EF4-FFF2-40B4-BE49-F238E27FC236}">
+                <a16:creationId xmlns:a16="http://schemas.microsoft.com/office/drawing/2014/main" id="{8AD24CA0-92B6-4541-93D4-43C9764E8E0B}"/>
+              </a:ext>
+            </a:extLst>
+          </p:cNvPr>
+          <p:cNvSpPr>
+            <a:spLocks noGrp="1"/>
+          </p:cNvSpPr>
+          <p:nvPr>
+            <p:ph idx="1"/>
+          </p:nvPr>
+        </p:nvSpPr>
+        <p:spPr/>
+        <p:txBody>
+          <a:bodyPr/>
+          <a:lstStyle/>
+          <a:p>
+            <a:endParaRPr lang="en-US"/>
+          </a:p>
+        </p:txBody>
+      </p:sp>
+    </p:spTree>
+    <p:extLst>
+      <p:ext uri="{BB962C8B-B14F-4D97-AF65-F5344CB8AC3E}">
+        <p14:creationId xmlns:p14="http://schemas.microsoft.com/office/powerpoint/2010/main" val="547053980"/>
+      </p:ext>
+    </p:extLst>
+  </p:cSld>
+  <p:clrMapOvr>
+    <a:masterClrMapping/>
+  </p:clrMapOvr>
+</p:sld>
+</file>
+
+<file path=ppt/slides/slide5.xml><?xml version="1.0" encoding="utf-8"?>
+<p:sld xmlns:a="http://schemas.openxmlformats.org/drawingml/2006/main" xmlns:r="http://schemas.openxmlformats.org/officeDocument/2006/relationships" xmlns:p="http://schemas.openxmlformats.org/presentationml/2006/main">
+  <p:cSld>
+    <p:spTree>
+      <p:nvGrpSpPr>
+        <p:cNvPr id="1" name=""/>
+        <p:cNvGrpSpPr/>
+        <p:nvPr/>
+      </p:nvGrpSpPr>
+      <p:grpSpPr>
+        <a:xfrm>
+          <a:off x="0" y="0"/>
+          <a:ext cx="0" cy="0"/>
+          <a:chOff x="0" y="0"/>
+          <a:chExt cx="0" cy="0"/>
+        </a:xfrm>
+      </p:grpSpPr>
+      <p:sp>
+        <p:nvSpPr>
+          <p:cNvPr id="2" name="Title 1">
+            <a:extLst>
+              <a:ext uri="{FF2B5EF4-FFF2-40B4-BE49-F238E27FC236}">
                 <a16:creationId xmlns:a16="http://schemas.microsoft.com/office/drawing/2014/main" id="{EF9D4B3B-288A-F244-A7C0-D85BAB3BF4B1}"/>
               </a:ext>
             </a:extLst>
@@ -3451,14 +4855,6 @@
           <a:bodyPr/>
           <a:lstStyle/>
           <a:p>
-            <a:r>
-              <a:rPr lang="en-US" dirty="0"/>
-              <a:t>We </a:t>
-            </a:r>
-            <a:r>
-              <a:rPr lang="en-US"/>
-              <a:t>condensed the </a:t>
-            </a:r>
             <a:endParaRPr lang="en-US" dirty="0"/>
           </a:p>
         </p:txBody>
@@ -3467,6 +4863,559 @@
     <p:extLst>
       <p:ext uri="{BB962C8B-B14F-4D97-AF65-F5344CB8AC3E}">
         <p14:creationId xmlns:p14="http://schemas.microsoft.com/office/powerpoint/2010/main" val="1922061756"/>
+      </p:ext>
+    </p:extLst>
+  </p:cSld>
+  <p:clrMapOvr>
+    <a:masterClrMapping/>
+  </p:clrMapOvr>
+</p:sld>
+</file>
+
+<file path=ppt/slides/slide6.xml><?xml version="1.0" encoding="utf-8"?>
+<p:sld xmlns:a="http://schemas.openxmlformats.org/drawingml/2006/main" xmlns:r="http://schemas.openxmlformats.org/officeDocument/2006/relationships" xmlns:p="http://schemas.openxmlformats.org/presentationml/2006/main">
+  <p:cSld>
+    <p:spTree>
+      <p:nvGrpSpPr>
+        <p:cNvPr id="1" name=""/>
+        <p:cNvGrpSpPr/>
+        <p:nvPr/>
+      </p:nvGrpSpPr>
+      <p:grpSpPr>
+        <a:xfrm>
+          <a:off x="0" y="0"/>
+          <a:ext cx="0" cy="0"/>
+          <a:chOff x="0" y="0"/>
+          <a:chExt cx="0" cy="0"/>
+        </a:xfrm>
+      </p:grpSpPr>
+      <p:sp>
+        <p:nvSpPr>
+          <p:cNvPr id="2" name="Title 1">
+            <a:extLst>
+              <a:ext uri="{FF2B5EF4-FFF2-40B4-BE49-F238E27FC236}">
+                <a16:creationId xmlns:a16="http://schemas.microsoft.com/office/drawing/2014/main" id="{9B5827D4-91A8-054C-A377-19F1E5F98A42}"/>
+              </a:ext>
+            </a:extLst>
+          </p:cNvPr>
+          <p:cNvSpPr>
+            <a:spLocks noGrp="1"/>
+          </p:cNvSpPr>
+          <p:nvPr>
+            <p:ph type="title"/>
+          </p:nvPr>
+        </p:nvSpPr>
+        <p:spPr/>
+        <p:txBody>
+          <a:bodyPr/>
+          <a:lstStyle/>
+          <a:p>
+            <a:r>
+              <a:rPr lang="en-US" dirty="0"/>
+              <a:t>Splitting the data set</a:t>
+            </a:r>
+          </a:p>
+        </p:txBody>
+      </p:sp>
+      <p:sp>
+        <p:nvSpPr>
+          <p:cNvPr id="3" name="Content Placeholder 2">
+            <a:extLst>
+              <a:ext uri="{FF2B5EF4-FFF2-40B4-BE49-F238E27FC236}">
+                <a16:creationId xmlns:a16="http://schemas.microsoft.com/office/drawing/2014/main" id="{5C87D316-8CE4-FF44-AF2D-DA4FA1DBC367}"/>
+              </a:ext>
+            </a:extLst>
+          </p:cNvPr>
+          <p:cNvSpPr>
+            <a:spLocks noGrp="1"/>
+          </p:cNvSpPr>
+          <p:nvPr>
+            <p:ph idx="1"/>
+          </p:nvPr>
+        </p:nvSpPr>
+        <p:spPr/>
+        <p:txBody>
+          <a:bodyPr/>
+          <a:lstStyle/>
+          <a:p>
+            <a:endParaRPr lang="en-US"/>
+          </a:p>
+        </p:txBody>
+      </p:sp>
+    </p:spTree>
+    <p:extLst>
+      <p:ext uri="{BB962C8B-B14F-4D97-AF65-F5344CB8AC3E}">
+        <p14:creationId xmlns:p14="http://schemas.microsoft.com/office/powerpoint/2010/main" val="3054456489"/>
+      </p:ext>
+    </p:extLst>
+  </p:cSld>
+  <p:clrMapOvr>
+    <a:masterClrMapping/>
+  </p:clrMapOvr>
+</p:sld>
+</file>
+
+<file path=ppt/slides/slide7.xml><?xml version="1.0" encoding="utf-8"?>
+<p:sld xmlns:a="http://schemas.openxmlformats.org/drawingml/2006/main" xmlns:r="http://schemas.openxmlformats.org/officeDocument/2006/relationships" xmlns:p="http://schemas.openxmlformats.org/presentationml/2006/main">
+  <p:cSld>
+    <p:bg>
+      <p:bgPr>
+        <a:solidFill>
+          <a:schemeClr val="bg1"/>
+        </a:solidFill>
+        <a:effectLst/>
+      </p:bgPr>
+    </p:bg>
+    <p:spTree>
+      <p:nvGrpSpPr>
+        <p:cNvPr id="1" name=""/>
+        <p:cNvGrpSpPr/>
+        <p:nvPr/>
+      </p:nvGrpSpPr>
+      <p:grpSpPr>
+        <a:xfrm>
+          <a:off x="0" y="0"/>
+          <a:ext cx="0" cy="0"/>
+          <a:chOff x="0" y="0"/>
+          <a:chExt cx="0" cy="0"/>
+        </a:xfrm>
+      </p:grpSpPr>
+      <p:sp>
+        <p:nvSpPr>
+          <p:cNvPr id="17" name="Rectangle 16">
+            <a:extLst>
+              <a:ext uri="{FF2B5EF4-FFF2-40B4-BE49-F238E27FC236}">
+                <a16:creationId xmlns:a16="http://schemas.microsoft.com/office/drawing/2014/main" id="{6753252F-4873-4F63-801D-CC719279A7D5}"/>
+              </a:ext>
+              <a:ext uri="{C183D7F6-B498-43B3-948B-1728B52AA6E4}">
+                <adec:decorative xmlns:adec="http://schemas.microsoft.com/office/drawing/2017/decorative" val="1"/>
+              </a:ext>
+            </a:extLst>
+          </p:cNvPr>
+          <p:cNvSpPr>
+            <a:spLocks noGrp="1" noRot="1" noChangeAspect="1" noMove="1" noResize="1" noEditPoints="1" noAdjustHandles="1" noChangeArrowheads="1" noChangeShapeType="1" noTextEdit="1"/>
+          </p:cNvSpPr>
+          <p:nvPr>
+            <p:extLst>
+              <p:ext uri="{386F3935-93C4-4BCD-93E2-E3B085C9AB24}">
+                <p16:designElem xmlns:p16="http://schemas.microsoft.com/office/powerpoint/2015/main" val="1"/>
+              </p:ext>
+            </p:extLst>
+          </p:nvPr>
+        </p:nvSpPr>
+        <p:spPr>
+          <a:xfrm>
+            <a:off x="0" y="0"/>
+            <a:ext cx="12192000" cy="6858000"/>
+          </a:xfrm>
+          <a:prstGeom prst="rect">
+            <a:avLst/>
+          </a:prstGeom>
+          <a:solidFill>
+            <a:srgbClr val="FFFFFF"/>
+          </a:solidFill>
+          <a:ln>
+            <a:noFill/>
+          </a:ln>
+        </p:spPr>
+        <p:style>
+          <a:lnRef idx="2">
+            <a:schemeClr val="accent1">
+              <a:shade val="50000"/>
+            </a:schemeClr>
+          </a:lnRef>
+          <a:fillRef idx="1">
+            <a:schemeClr val="accent1"/>
+          </a:fillRef>
+          <a:effectRef idx="0">
+            <a:schemeClr val="accent1"/>
+          </a:effectRef>
+          <a:fontRef idx="minor">
+            <a:schemeClr val="lt1"/>
+          </a:fontRef>
+        </p:style>
+        <p:txBody>
+          <a:bodyPr rtlCol="0" anchor="ctr"/>
+          <a:lstStyle/>
+          <a:p>
+            <a:pPr algn="ctr"/>
+            <a:endParaRPr lang="en-US"/>
+          </a:p>
+        </p:txBody>
+      </p:sp>
+      <p:sp>
+        <p:nvSpPr>
+          <p:cNvPr id="19" name="Rectangle 18">
+            <a:extLst>
+              <a:ext uri="{FF2B5EF4-FFF2-40B4-BE49-F238E27FC236}">
+                <a16:creationId xmlns:a16="http://schemas.microsoft.com/office/drawing/2014/main" id="{047C8CCB-F95D-4249-92DD-651249D3535A}"/>
+              </a:ext>
+              <a:ext uri="{C183D7F6-B498-43B3-948B-1728B52AA6E4}">
+                <adec:decorative xmlns:adec="http://schemas.microsoft.com/office/drawing/2017/decorative" val="1"/>
+              </a:ext>
+            </a:extLst>
+          </p:cNvPr>
+          <p:cNvSpPr>
+            <a:spLocks noGrp="1" noRot="1" noChangeAspect="1" noMove="1" noResize="1" noEditPoints="1" noAdjustHandles="1" noChangeArrowheads="1" noChangeShapeType="1" noTextEdit="1"/>
+          </p:cNvSpPr>
+          <p:nvPr>
+            <p:extLst>
+              <p:ext uri="{386F3935-93C4-4BCD-93E2-E3B085C9AB24}">
+                <p16:designElem xmlns:p16="http://schemas.microsoft.com/office/powerpoint/2015/main" val="1"/>
+              </p:ext>
+            </p:extLst>
+          </p:nvPr>
+        </p:nvSpPr>
+        <p:spPr>
+          <a:xfrm>
+            <a:off x="0" y="0"/>
+            <a:ext cx="2013557" cy="6858000"/>
+          </a:xfrm>
+          <a:prstGeom prst="rect">
+            <a:avLst/>
+          </a:prstGeom>
+          <a:solidFill>
+            <a:srgbClr val="7F7F7F"/>
+          </a:solidFill>
+          <a:ln>
+            <a:noFill/>
+          </a:ln>
+        </p:spPr>
+        <p:style>
+          <a:lnRef idx="2">
+            <a:schemeClr val="accent1">
+              <a:shade val="50000"/>
+            </a:schemeClr>
+          </a:lnRef>
+          <a:fillRef idx="1">
+            <a:schemeClr val="accent1"/>
+          </a:fillRef>
+          <a:effectRef idx="0">
+            <a:schemeClr val="accent1"/>
+          </a:effectRef>
+          <a:fontRef idx="minor">
+            <a:schemeClr val="lt1"/>
+          </a:fontRef>
+        </p:style>
+        <p:txBody>
+          <a:bodyPr rtlCol="0" anchor="ctr"/>
+          <a:lstStyle/>
+          <a:p>
+            <a:pPr algn="ctr"/>
+            <a:endParaRPr lang="en-US"/>
+          </a:p>
+        </p:txBody>
+      </p:sp>
+      <p:sp>
+        <p:nvSpPr>
+          <p:cNvPr id="2" name="Title 1">
+            <a:extLst>
+              <a:ext uri="{FF2B5EF4-FFF2-40B4-BE49-F238E27FC236}">
+                <a16:creationId xmlns:a16="http://schemas.microsoft.com/office/drawing/2014/main" id="{7A0EFF9F-5EDC-964C-9193-A51611DCEC21}"/>
+              </a:ext>
+            </a:extLst>
+          </p:cNvPr>
+          <p:cNvSpPr>
+            <a:spLocks noGrp="1"/>
+          </p:cNvSpPr>
+          <p:nvPr>
+            <p:ph type="title"/>
+          </p:nvPr>
+        </p:nvSpPr>
+        <p:spPr>
+          <a:xfrm>
+            <a:off x="640080" y="2074363"/>
+            <a:ext cx="2752354" cy="2709275"/>
+          </a:xfrm>
+          <a:prstGeom prst="ellipse">
+            <a:avLst/>
+          </a:prstGeom>
+          <a:solidFill>
+            <a:srgbClr val="262626"/>
+          </a:solidFill>
+          <a:ln w="174625" cmpd="thinThick">
+            <a:solidFill>
+              <a:srgbClr val="262626"/>
+            </a:solidFill>
+          </a:ln>
+        </p:spPr>
+        <p:txBody>
+          <a:bodyPr vert="horz" lIns="91440" tIns="45720" rIns="91440" bIns="45720" rtlCol="0" anchor="ctr">
+            <a:normAutofit/>
+          </a:bodyPr>
+          <a:lstStyle/>
+          <a:p>
+            <a:pPr algn="ctr"/>
+            <a:r>
+              <a:rPr lang="en-US" sz="2600" kern="1200">
+                <a:solidFill>
+                  <a:srgbClr val="FFFFFF"/>
+                </a:solidFill>
+                <a:latin typeface="+mj-lt"/>
+                <a:ea typeface="+mj-ea"/>
+                <a:cs typeface="+mj-cs"/>
+              </a:rPr>
+              <a:t>Detector Model</a:t>
+            </a:r>
+          </a:p>
+        </p:txBody>
+      </p:sp>
+      <p:pic>
+        <p:nvPicPr>
+          <p:cNvPr id="9" name="Content Placeholder 8" descr="A close up of a mans face&#10;&#10;Description automatically generated">
+            <a:extLst>
+              <a:ext uri="{FF2B5EF4-FFF2-40B4-BE49-F238E27FC236}">
+                <a16:creationId xmlns:a16="http://schemas.microsoft.com/office/drawing/2014/main" id="{6777F3AC-5F2F-BA4F-99E4-CE74A138B96D}"/>
+              </a:ext>
+            </a:extLst>
+          </p:cNvPr>
+          <p:cNvPicPr>
+            <a:picLocks noGrp="1" noChangeAspect="1"/>
+          </p:cNvPicPr>
+          <p:nvPr>
+            <p:ph idx="1"/>
+          </p:nvPr>
+        </p:nvPicPr>
+        <p:blipFill>
+          <a:blip r:embed="rId2"/>
+          <a:stretch>
+            <a:fillRect/>
+          </a:stretch>
+        </p:blipFill>
+        <p:spPr>
+          <a:xfrm>
+            <a:off x="4239651" y="189079"/>
+            <a:ext cx="6708825" cy="4930987"/>
+          </a:xfrm>
+          <a:prstGeom prst="rect">
+            <a:avLst/>
+          </a:prstGeom>
+        </p:spPr>
+      </p:pic>
+      <p:sp>
+        <p:nvSpPr>
+          <p:cNvPr id="11" name="TextBox 10">
+            <a:extLst>
+              <a:ext uri="{FF2B5EF4-FFF2-40B4-BE49-F238E27FC236}">
+                <a16:creationId xmlns:a16="http://schemas.microsoft.com/office/drawing/2014/main" id="{23CA3748-2A5B-554B-A4E3-ADB28C11E9CB}"/>
+              </a:ext>
+            </a:extLst>
+          </p:cNvPr>
+          <p:cNvSpPr txBox="1"/>
+          <p:nvPr/>
+        </p:nvSpPr>
+        <p:spPr>
+          <a:xfrm>
+            <a:off x="5595823" y="5309145"/>
+            <a:ext cx="3996479" cy="707886"/>
+          </a:xfrm>
+          <a:prstGeom prst="rect">
+            <a:avLst/>
+          </a:prstGeom>
+          <a:noFill/>
+        </p:spPr>
+        <p:txBody>
+          <a:bodyPr wrap="none" rtlCol="0">
+            <a:spAutoFit/>
+          </a:bodyPr>
+          <a:lstStyle/>
+          <a:p>
+            <a:r>
+              <a:rPr lang="en-US" sz="2000" dirty="0"/>
+              <a:t>Loss function: </a:t>
+            </a:r>
+            <a:r>
+              <a:rPr lang="en-US" sz="2000" dirty="0" err="1"/>
+              <a:t>Mean_Absolute_Error</a:t>
+            </a:r>
+            <a:endParaRPr lang="en-US" sz="2000" dirty="0"/>
+          </a:p>
+          <a:p>
+            <a:r>
+              <a:rPr lang="en-US" sz="2000" dirty="0"/>
+              <a:t>Optimizer: </a:t>
+            </a:r>
+            <a:r>
+              <a:rPr lang="en-US" sz="2000" dirty="0" err="1"/>
+              <a:t>RMSprop</a:t>
+            </a:r>
+            <a:endParaRPr lang="en-US" sz="2000" dirty="0"/>
+          </a:p>
+        </p:txBody>
+      </p:sp>
+    </p:spTree>
+    <p:extLst>
+      <p:ext uri="{BB962C8B-B14F-4D97-AF65-F5344CB8AC3E}">
+        <p14:creationId xmlns:p14="http://schemas.microsoft.com/office/powerpoint/2010/main" val="1772967276"/>
+      </p:ext>
+    </p:extLst>
+  </p:cSld>
+  <p:clrMapOvr>
+    <a:masterClrMapping/>
+  </p:clrMapOvr>
+</p:sld>
+</file>
+
+<file path=ppt/slides/slide8.xml><?xml version="1.0" encoding="utf-8"?>
+<p:sld xmlns:a="http://schemas.openxmlformats.org/drawingml/2006/main" xmlns:r="http://schemas.openxmlformats.org/officeDocument/2006/relationships" xmlns:p="http://schemas.openxmlformats.org/presentationml/2006/main">
+  <p:cSld>
+    <p:spTree>
+      <p:nvGrpSpPr>
+        <p:cNvPr id="1" name=""/>
+        <p:cNvGrpSpPr/>
+        <p:nvPr/>
+      </p:nvGrpSpPr>
+      <p:grpSpPr>
+        <a:xfrm>
+          <a:off x="0" y="0"/>
+          <a:ext cx="0" cy="0"/>
+          <a:chOff x="0" y="0"/>
+          <a:chExt cx="0" cy="0"/>
+        </a:xfrm>
+      </p:grpSpPr>
+      <p:sp>
+        <p:nvSpPr>
+          <p:cNvPr id="2" name="Title 1">
+            <a:extLst>
+              <a:ext uri="{FF2B5EF4-FFF2-40B4-BE49-F238E27FC236}">
+                <a16:creationId xmlns:a16="http://schemas.microsoft.com/office/drawing/2014/main" id="{F63449F7-9871-DC40-B779-F1D229CF94FD}"/>
+              </a:ext>
+            </a:extLst>
+          </p:cNvPr>
+          <p:cNvSpPr>
+            <a:spLocks noGrp="1"/>
+          </p:cNvSpPr>
+          <p:nvPr>
+            <p:ph type="title"/>
+          </p:nvPr>
+        </p:nvSpPr>
+        <p:spPr/>
+        <p:txBody>
+          <a:bodyPr/>
+          <a:lstStyle/>
+          <a:p>
+            <a:br>
+              <a:rPr lang="en-US" dirty="0"/>
+            </a:br>
+            <a:r>
+              <a:rPr lang="en-US" dirty="0"/>
+              <a:t>Experiment Results: attack 1,2,4,8,16</a:t>
+            </a:r>
+          </a:p>
+        </p:txBody>
+      </p:sp>
+      <p:sp>
+        <p:nvSpPr>
+          <p:cNvPr id="3" name="Content Placeholder 2">
+            <a:extLst>
+              <a:ext uri="{FF2B5EF4-FFF2-40B4-BE49-F238E27FC236}">
+                <a16:creationId xmlns:a16="http://schemas.microsoft.com/office/drawing/2014/main" id="{FBC9B68B-F4E5-5941-9BF3-403EB7E43A52}"/>
+              </a:ext>
+            </a:extLst>
+          </p:cNvPr>
+          <p:cNvSpPr>
+            <a:spLocks noGrp="1"/>
+          </p:cNvSpPr>
+          <p:nvPr>
+            <p:ph idx="1"/>
+          </p:nvPr>
+        </p:nvSpPr>
+        <p:spPr/>
+        <p:txBody>
+          <a:bodyPr/>
+          <a:lstStyle/>
+          <a:p>
+            <a:endParaRPr lang="en-US" dirty="0"/>
+          </a:p>
+        </p:txBody>
+      </p:sp>
+    </p:spTree>
+    <p:extLst>
+      <p:ext uri="{BB962C8B-B14F-4D97-AF65-F5344CB8AC3E}">
+        <p14:creationId xmlns:p14="http://schemas.microsoft.com/office/powerpoint/2010/main" val="2675877458"/>
+      </p:ext>
+    </p:extLst>
+  </p:cSld>
+  <p:clrMapOvr>
+    <a:masterClrMapping/>
+  </p:clrMapOvr>
+</p:sld>
+</file>
+
+<file path=ppt/slides/slide9.xml><?xml version="1.0" encoding="utf-8"?>
+<p:sld xmlns:a="http://schemas.openxmlformats.org/drawingml/2006/main" xmlns:r="http://schemas.openxmlformats.org/officeDocument/2006/relationships" xmlns:p="http://schemas.openxmlformats.org/presentationml/2006/main">
+  <p:cSld>
+    <p:spTree>
+      <p:nvGrpSpPr>
+        <p:cNvPr id="1" name=""/>
+        <p:cNvGrpSpPr/>
+        <p:nvPr/>
+      </p:nvGrpSpPr>
+      <p:grpSpPr>
+        <a:xfrm>
+          <a:off x="0" y="0"/>
+          <a:ext cx="0" cy="0"/>
+          <a:chOff x="0" y="0"/>
+          <a:chExt cx="0" cy="0"/>
+        </a:xfrm>
+      </p:grpSpPr>
+      <p:sp>
+        <p:nvSpPr>
+          <p:cNvPr id="2" name="Title 1">
+            <a:extLst>
+              <a:ext uri="{FF2B5EF4-FFF2-40B4-BE49-F238E27FC236}">
+                <a16:creationId xmlns:a16="http://schemas.microsoft.com/office/drawing/2014/main" id="{C040090E-8AA7-9340-B233-4C08F449B134}"/>
+              </a:ext>
+            </a:extLst>
+          </p:cNvPr>
+          <p:cNvSpPr>
+            <a:spLocks noGrp="1"/>
+          </p:cNvSpPr>
+          <p:nvPr>
+            <p:ph type="title"/>
+          </p:nvPr>
+        </p:nvSpPr>
+        <p:spPr/>
+        <p:txBody>
+          <a:bodyPr/>
+          <a:lstStyle/>
+          <a:p>
+            <a:r>
+              <a:rPr lang="en-US" dirty="0"/>
+              <a:t>Experiment Results: overall attack </a:t>
+            </a:r>
+          </a:p>
+        </p:txBody>
+      </p:sp>
+      <p:sp>
+        <p:nvSpPr>
+          <p:cNvPr id="3" name="Content Placeholder 2">
+            <a:extLst>
+              <a:ext uri="{FF2B5EF4-FFF2-40B4-BE49-F238E27FC236}">
+                <a16:creationId xmlns:a16="http://schemas.microsoft.com/office/drawing/2014/main" id="{B8C47D5C-8E0E-0446-813F-C5DAA609CB0B}"/>
+              </a:ext>
+            </a:extLst>
+          </p:cNvPr>
+          <p:cNvSpPr>
+            <a:spLocks noGrp="1"/>
+          </p:cNvSpPr>
+          <p:nvPr>
+            <p:ph idx="1"/>
+          </p:nvPr>
+        </p:nvSpPr>
+        <p:spPr/>
+        <p:txBody>
+          <a:bodyPr/>
+          <a:lstStyle/>
+          <a:p>
+            <a:endParaRPr lang="en-US"/>
+          </a:p>
+        </p:txBody>
+      </p:sp>
+    </p:spTree>
+    <p:extLst>
+      <p:ext uri="{BB962C8B-B14F-4D97-AF65-F5344CB8AC3E}">
+        <p14:creationId xmlns:p14="http://schemas.microsoft.com/office/powerpoint/2010/main" val="3291415202"/>
       </p:ext>
     </p:extLst>
   </p:cSld>

</xml_diff>

<commit_message>
update presentations and report
</commit_message>
<xml_diff>
--- a/slide/Presentation.pptx
+++ b/slide/Presentation.pptx
@@ -120,6 +120,11 @@
       </a:defRPr>
     </a:lvl9pPr>
   </p:defaultTextStyle>
+  <p:extLst>
+    <p:ext uri="{EFAFB233-063F-42B5-8137-9DF3F51BA10A}">
+      <p15:sldGuideLst xmlns:p15="http://schemas.microsoft.com/office/powerpoint/2012/main"/>
+    </p:ext>
+  </p:extLst>
 </p:presentation>
 </file>
 
@@ -4717,7 +4722,7 @@
                 </a:solidFill>
                 <a:latin typeface="Calibri"/>
               </a:rPr>
-              <a:t>6/15/19</a:t>
+              <a:t>6/18/19</a:t>
             </a:fld>
             <a:endParaRPr lang="en-US" sz="1200" b="0" strike="noStrike" spc="-1">
               <a:latin typeface="Times New Roman"/>
@@ -5527,7 +5532,7 @@
                 </a:solidFill>
                 <a:latin typeface="Calibri"/>
               </a:rPr>
-              <a:t>6/15/19</a:t>
+              <a:t>6/18/19</a:t>
             </a:fld>
             <a:endParaRPr lang="en-US" sz="1200" b="0" strike="noStrike" spc="-1">
               <a:latin typeface="Times New Roman"/>
@@ -6062,7 +6067,7 @@
                 </a:solidFill>
                 <a:latin typeface="Calibri"/>
               </a:rPr>
-              <a:t>6/15/19</a:t>
+              <a:t>6/18/19</a:t>
             </a:fld>
             <a:endParaRPr lang="en-US" sz="1200" b="0" strike="noStrike" spc="-1">
               <a:latin typeface="Times New Roman"/>
@@ -9654,7 +9659,7 @@
                         </a:lnSpc>
                       </a:pPr>
                       <a:r>
-                        <a:rPr lang="en-US" sz="1800" b="0" strike="noStrike" spc="-1">
+                        <a:rPr lang="en-US" sz="1800" b="0" strike="noStrike" spc="-1" dirty="0">
                           <a:solidFill>
                             <a:srgbClr val="000000"/>
                           </a:solidFill>
@@ -9662,7 +9667,7 @@
                         </a:rPr>
                         <a:t>0.0212</a:t>
                       </a:r>
-                      <a:endParaRPr lang="en-US" sz="1800" b="0" strike="noStrike" spc="-1">
+                      <a:endParaRPr lang="en-US" sz="1800" b="0" strike="noStrike" spc="-1" dirty="0">
                         <a:latin typeface="Arial"/>
                       </a:endParaRPr>
                     </a:p>
@@ -9708,7 +9713,7 @@
                         </a:lnSpc>
                       </a:pPr>
                       <a:r>
-                        <a:rPr lang="en-US" sz="1800" b="0" strike="noStrike" spc="-1">
+                        <a:rPr lang="en-US" sz="1800" b="0" strike="noStrike" spc="-1" dirty="0">
                           <a:solidFill>
                             <a:srgbClr val="000000"/>
                           </a:solidFill>
@@ -9716,7 +9721,7 @@
                         </a:rPr>
                         <a:t>0.0779</a:t>
                       </a:r>
-                      <a:endParaRPr lang="en-US" sz="1800" b="0" strike="noStrike" spc="-1">
+                      <a:endParaRPr lang="en-US" sz="1800" b="0" strike="noStrike" spc="-1" dirty="0">
                         <a:latin typeface="Arial"/>
                       </a:endParaRPr>
                     </a:p>
@@ -9762,7 +9767,7 @@
                         </a:lnSpc>
                       </a:pPr>
                       <a:r>
-                        <a:rPr lang="en-US" sz="1800" b="0" strike="noStrike" spc="-1">
+                        <a:rPr lang="en-US" sz="1800" b="0" strike="noStrike" spc="-1" dirty="0">
                           <a:solidFill>
                             <a:srgbClr val="000000"/>
                           </a:solidFill>
@@ -9770,7 +9775,7 @@
                         </a:rPr>
                         <a:t>0.0191</a:t>
                       </a:r>
-                      <a:endParaRPr lang="en-US" sz="1800" b="0" strike="noStrike" spc="-1">
+                      <a:endParaRPr lang="en-US" sz="1800" b="0" strike="noStrike" spc="-1" dirty="0">
                         <a:latin typeface="Arial"/>
                       </a:endParaRPr>
                     </a:p>
@@ -9816,7 +9821,7 @@
                         </a:lnSpc>
                       </a:pPr>
                       <a:r>
-                        <a:rPr lang="en-US" sz="1800" b="0" strike="noStrike" spc="-1">
+                        <a:rPr lang="en-US" sz="1800" b="0" strike="noStrike" spc="-1" dirty="0">
                           <a:solidFill>
                             <a:srgbClr val="000000"/>
                           </a:solidFill>
@@ -9824,7 +9829,7 @@
                         </a:rPr>
                         <a:t>0.1145</a:t>
                       </a:r>
-                      <a:endParaRPr lang="en-US" sz="1800" b="0" strike="noStrike" spc="-1">
+                      <a:endParaRPr lang="en-US" sz="1800" b="0" strike="noStrike" spc="-1" dirty="0">
                         <a:latin typeface="Arial"/>
                       </a:endParaRPr>
                     </a:p>
@@ -9927,7 +9932,7 @@
                         </a:lnSpc>
                       </a:pPr>
                       <a:r>
-                        <a:rPr lang="en-US" sz="1800" b="0" strike="noStrike" spc="-1">
+                        <a:rPr lang="en-US" sz="1800" b="0" strike="noStrike" spc="-1" dirty="0">
                           <a:solidFill>
                             <a:srgbClr val="000000"/>
                           </a:solidFill>
@@ -9935,7 +9940,7 @@
                         </a:rPr>
                         <a:t>0.0016</a:t>
                       </a:r>
-                      <a:endParaRPr lang="en-US" sz="1800" b="0" strike="noStrike" spc="-1">
+                      <a:endParaRPr lang="en-US" sz="1800" b="0" strike="noStrike" spc="-1" dirty="0">
                         <a:latin typeface="Arial"/>
                       </a:endParaRPr>
                     </a:p>
@@ -10027,7 +10032,7 @@
                         </a:lnSpc>
                       </a:pPr>
                       <a:r>
-                        <a:rPr lang="en-US" sz="1800" b="0" strike="noStrike" spc="-1">
+                        <a:rPr lang="en-US" sz="1800" b="0" strike="noStrike" spc="-1" dirty="0">
                           <a:solidFill>
                             <a:srgbClr val="000000"/>
                           </a:solidFill>
@@ -10035,7 +10040,7 @@
                         </a:rPr>
                         <a:t>0.0096</a:t>
                       </a:r>
-                      <a:endParaRPr lang="en-US" sz="1800" b="0" strike="noStrike" spc="-1">
+                      <a:endParaRPr lang="en-US" sz="1800" b="0" strike="noStrike" spc="-1" dirty="0">
                         <a:latin typeface="Arial"/>
                       </a:endParaRPr>
                     </a:p>
@@ -10077,7 +10082,7 @@
                         </a:lnSpc>
                       </a:pPr>
                       <a:r>
-                        <a:rPr lang="en-US" sz="1800" b="0" strike="noStrike" spc="-1">
+                        <a:rPr lang="en-US" sz="1800" b="0" strike="noStrike" spc="-1" dirty="0">
                           <a:solidFill>
                             <a:srgbClr val="000000"/>
                           </a:solidFill>
@@ -10085,7 +10090,7 @@
                         </a:rPr>
                         <a:t>0.0444</a:t>
                       </a:r>
-                      <a:endParaRPr lang="en-US" sz="1800" b="0" strike="noStrike" spc="-1">
+                      <a:endParaRPr lang="en-US" sz="1800" b="0" strike="noStrike" spc="-1" dirty="0">
                         <a:latin typeface="Arial"/>
                       </a:endParaRPr>
                     </a:p>
@@ -10127,7 +10132,7 @@
                         </a:lnSpc>
                       </a:pPr>
                       <a:r>
-                        <a:rPr lang="en-US" sz="1800" b="0" strike="noStrike" spc="-1">
+                        <a:rPr lang="en-US" sz="1800" b="0" strike="noStrike" spc="-1" dirty="0">
                           <a:solidFill>
                             <a:srgbClr val="000000"/>
                           </a:solidFill>
@@ -10135,7 +10140,7 @@
                         </a:rPr>
                         <a:t>0.0043</a:t>
                       </a:r>
-                      <a:endParaRPr lang="en-US" sz="1800" b="0" strike="noStrike" spc="-1">
+                      <a:endParaRPr lang="en-US" sz="1800" b="0" strike="noStrike" spc="-1" dirty="0">
                         <a:latin typeface="Arial"/>
                       </a:endParaRPr>
                     </a:p>
@@ -10234,7 +10239,7 @@
                         </a:lnSpc>
                       </a:pPr>
                       <a:r>
-                        <a:rPr lang="en-US" sz="1800" b="0" strike="noStrike" spc="-1">
+                        <a:rPr lang="en-US" sz="1800" b="0" strike="noStrike" spc="-1" dirty="0">
                           <a:solidFill>
                             <a:srgbClr val="000000"/>
                           </a:solidFill>
@@ -10242,7 +10247,7 @@
                         </a:rPr>
                         <a:t>0.0005</a:t>
                       </a:r>
-                      <a:endParaRPr lang="en-US" sz="1800" b="0" strike="noStrike" spc="-1">
+                      <a:endParaRPr lang="en-US" sz="1800" b="0" strike="noStrike" spc="-1" dirty="0">
                         <a:latin typeface="Arial"/>
                       </a:endParaRPr>
                     </a:p>
@@ -10384,7 +10389,7 @@
                         </a:lnSpc>
                       </a:pPr>
                       <a:r>
-                        <a:rPr lang="en-US" sz="1800" b="0" strike="noStrike" spc="-1">
+                        <a:rPr lang="en-US" sz="1800" b="0" strike="noStrike" spc="-1" dirty="0">
                           <a:solidFill>
                             <a:srgbClr val="000000"/>
                           </a:solidFill>
@@ -10392,7 +10397,7 @@
                         </a:rPr>
                         <a:t>0.0068</a:t>
                       </a:r>
-                      <a:endParaRPr lang="en-US" sz="1800" b="0" strike="noStrike" spc="-1">
+                      <a:endParaRPr lang="en-US" sz="1800" b="0" strike="noStrike" spc="-1" dirty="0">
                         <a:latin typeface="Arial"/>
                       </a:endParaRPr>
                     </a:p>
@@ -10434,7 +10439,7 @@
                         </a:lnSpc>
                       </a:pPr>
                       <a:r>
-                        <a:rPr lang="en-US" sz="1800" b="0" strike="noStrike" spc="-1">
+                        <a:rPr lang="en-US" sz="1800" b="0" strike="noStrike" spc="-1" dirty="0">
                           <a:solidFill>
                             <a:srgbClr val="000000"/>
                           </a:solidFill>
@@ -10442,7 +10447,7 @@
                         </a:rPr>
                         <a:t>0.0018</a:t>
                       </a:r>
-                      <a:endParaRPr lang="en-US" sz="1800" b="0" strike="noStrike" spc="-1">
+                      <a:endParaRPr lang="en-US" sz="1800" b="0" strike="noStrike" spc="-1" dirty="0">
                         <a:latin typeface="Arial"/>
                       </a:endParaRPr>
                     </a:p>
@@ -10641,7 +10646,7 @@
                         </a:lnSpc>
                       </a:pPr>
                       <a:r>
-                        <a:rPr lang="en-US" sz="1800" b="0" strike="noStrike" spc="-1">
+                        <a:rPr lang="en-US" sz="1800" b="0" strike="noStrike" spc="-1" dirty="0">
                           <a:solidFill>
                             <a:srgbClr val="000000"/>
                           </a:solidFill>
@@ -10649,7 +10654,7 @@
                         </a:rPr>
                         <a:t>0.0040</a:t>
                       </a:r>
-                      <a:endParaRPr lang="en-US" sz="1800" b="0" strike="noStrike" spc="-1">
+                      <a:endParaRPr lang="en-US" sz="1800" b="0" strike="noStrike" spc="-1" dirty="0">
                         <a:latin typeface="Arial"/>
                       </a:endParaRPr>
                     </a:p>
@@ -10741,7 +10746,7 @@
                         </a:lnSpc>
                       </a:pPr>
                       <a:r>
-                        <a:rPr lang="en-US" sz="1800" b="0" strike="noStrike" spc="-1">
+                        <a:rPr lang="en-US" sz="1800" b="0" strike="noStrike" spc="-1" dirty="0">
                           <a:solidFill>
                             <a:srgbClr val="000000"/>
                           </a:solidFill>
@@ -10749,7 +10754,7 @@
                         </a:rPr>
                         <a:t>0.0243</a:t>
                       </a:r>
-                      <a:endParaRPr lang="en-US" sz="1800" b="0" strike="noStrike" spc="-1">
+                      <a:endParaRPr lang="en-US" sz="1800" b="0" strike="noStrike" spc="-1" dirty="0">
                         <a:latin typeface="Arial"/>
                       </a:endParaRPr>
                     </a:p>
@@ -10848,7 +10853,7 @@
                         </a:lnSpc>
                       </a:pPr>
                       <a:r>
-                        <a:rPr lang="en-US" sz="1800" b="0" strike="noStrike" spc="-1">
+                        <a:rPr lang="en-US" sz="1800" b="0" strike="noStrike" spc="-1" dirty="0">
                           <a:solidFill>
                             <a:srgbClr val="000000"/>
                           </a:solidFill>
@@ -10856,7 +10861,7 @@
                         </a:rPr>
                         <a:t>0.2707</a:t>
                       </a:r>
-                      <a:endParaRPr lang="en-US" sz="1800" b="0" strike="noStrike" spc="-1">
+                      <a:endParaRPr lang="en-US" sz="1800" b="0" strike="noStrike" spc="-1" dirty="0">
                         <a:latin typeface="Arial"/>
                       </a:endParaRPr>
                     </a:p>
@@ -10898,7 +10903,7 @@
                         </a:lnSpc>
                       </a:pPr>
                       <a:r>
-                        <a:rPr lang="en-US" sz="1800" b="0" strike="noStrike" spc="-1">
+                        <a:rPr lang="en-US" sz="1800" b="0" strike="noStrike" spc="-1" dirty="0">
                           <a:solidFill>
                             <a:srgbClr val="000000"/>
                           </a:solidFill>
@@ -10906,7 +10911,7 @@
                         </a:rPr>
                         <a:t>0.0620</a:t>
                       </a:r>
-                      <a:endParaRPr lang="en-US" sz="1800" b="0" strike="noStrike" spc="-1">
+                      <a:endParaRPr lang="en-US" sz="1800" b="0" strike="noStrike" spc="-1" dirty="0">
                         <a:latin typeface="Arial"/>
                       </a:endParaRPr>
                     </a:p>
@@ -10948,7 +10953,7 @@
                         </a:lnSpc>
                       </a:pPr>
                       <a:r>
-                        <a:rPr lang="en-US" sz="1800" b="0" strike="noStrike" spc="-1">
+                        <a:rPr lang="en-US" sz="1800" b="0" strike="noStrike" spc="-1" dirty="0">
                           <a:solidFill>
                             <a:srgbClr val="000000"/>
                           </a:solidFill>
@@ -10956,7 +10961,7 @@
                         </a:rPr>
                         <a:t>0.0344</a:t>
                       </a:r>
-                      <a:endParaRPr lang="en-US" sz="1800" b="0" strike="noStrike" spc="-1">
+                      <a:endParaRPr lang="en-US" sz="1800" b="0" strike="noStrike" spc="-1" dirty="0">
                         <a:latin typeface="Arial"/>
                       </a:endParaRPr>
                     </a:p>
@@ -10998,7 +11003,7 @@
                         </a:lnSpc>
                       </a:pPr>
                       <a:r>
-                        <a:rPr lang="en-US" sz="1800" b="0" strike="noStrike" spc="-1">
+                        <a:rPr lang="en-US" sz="1800" b="0" strike="noStrike" spc="-1" dirty="0">
                           <a:solidFill>
                             <a:srgbClr val="000000"/>
                           </a:solidFill>
@@ -11006,7 +11011,7 @@
                         </a:rPr>
                         <a:t>0.0450</a:t>
                       </a:r>
-                      <a:endParaRPr lang="en-US" sz="1800" b="0" strike="noStrike" spc="-1">
+                      <a:endParaRPr lang="en-US" sz="1800" b="0" strike="noStrike" spc="-1" dirty="0">
                         <a:latin typeface="Arial"/>
                       </a:endParaRPr>
                     </a:p>
@@ -11321,14 +11326,14 @@
       </p:grpSpPr>
       <p:sp>
         <p:nvSpPr>
-          <p:cNvPr id="160" name="TextShape 1"/>
+          <p:cNvPr id="161" name="TextShape 2"/>
           <p:cNvSpPr txBox="1"/>
           <p:nvPr/>
         </p:nvSpPr>
         <p:spPr>
           <a:xfrm>
-            <a:off x="838080" y="365040"/>
-            <a:ext cx="10515240" cy="1325160"/>
+            <a:off x="838080" y="1825560"/>
+            <a:ext cx="10515240" cy="4350960"/>
           </a:xfrm>
           <a:prstGeom prst="rect">
             <a:avLst/>
@@ -11339,56 +11344,147 @@
           </a:ln>
         </p:spPr>
         <p:txBody>
-          <a:bodyPr anchor="ctr"/>
+          <a:bodyPr/>
           <a:lstStyle/>
           <a:p>
-            <a:pPr>
+            <a:endParaRPr lang="en-US" sz="2800" b="0" strike="noStrike" spc="-1">
+              <a:solidFill>
+                <a:srgbClr val="000000"/>
+              </a:solidFill>
+              <a:latin typeface="Calibri"/>
+            </a:endParaRPr>
+          </a:p>
+        </p:txBody>
+      </p:sp>
+      <p:pic>
+        <p:nvPicPr>
+          <p:cNvPr id="3" name="Picture 2" descr="A close up of text on a white background&#10;&#10;Description automatically generated">
+            <a:extLst>
+              <a:ext uri="{FF2B5EF4-FFF2-40B4-BE49-F238E27FC236}">
+                <a16:creationId xmlns:a16="http://schemas.microsoft.com/office/drawing/2014/main" id="{7FC30B5C-2993-0C49-A88E-F79855D9485C}"/>
+              </a:ext>
+            </a:extLst>
+          </p:cNvPr>
+          <p:cNvPicPr>
+            <a:picLocks noChangeAspect="1"/>
+          </p:cNvPicPr>
+          <p:nvPr/>
+        </p:nvPicPr>
+        <p:blipFill>
+          <a:blip r:embed="rId2">
+            <a:extLst>
+              <a:ext uri="{28A0092B-C50C-407E-A947-70E740481C1C}">
+                <a14:useLocalDpi xmlns:a14="http://schemas.microsoft.com/office/drawing/2010/main" val="0"/>
+              </a:ext>
+            </a:extLst>
+          </a:blip>
+          <a:stretch>
+            <a:fillRect/>
+          </a:stretch>
+        </p:blipFill>
+        <p:spPr>
+          <a:xfrm>
+            <a:off x="2320569" y="-360"/>
+            <a:ext cx="9870831" cy="6858000"/>
+          </a:xfrm>
+          <a:prstGeom prst="rect">
+            <a:avLst/>
+          </a:prstGeom>
+        </p:spPr>
+      </p:pic>
+      <p:sp>
+        <p:nvSpPr>
+          <p:cNvPr id="6" name="CustomShape 2">
+            <a:extLst>
+              <a:ext uri="{FF2B5EF4-FFF2-40B4-BE49-F238E27FC236}">
+                <a16:creationId xmlns:a16="http://schemas.microsoft.com/office/drawing/2014/main" id="{F361AEC5-62C0-7A46-B3C2-B49D540B15BE}"/>
+              </a:ext>
+            </a:extLst>
+          </p:cNvPr>
+          <p:cNvSpPr/>
+          <p:nvPr/>
+        </p:nvSpPr>
+        <p:spPr>
+          <a:xfrm>
+            <a:off x="0" y="0"/>
+            <a:ext cx="1482489" cy="6858000"/>
+          </a:xfrm>
+          <a:prstGeom prst="rect">
+            <a:avLst/>
+          </a:prstGeom>
+          <a:solidFill>
+            <a:srgbClr val="7F7F7F"/>
+          </a:solidFill>
+          <a:ln>
+            <a:noFill/>
+          </a:ln>
+        </p:spPr>
+        <p:style>
+          <a:lnRef idx="2">
+            <a:schemeClr val="accent1">
+              <a:shade val="50000"/>
+            </a:schemeClr>
+          </a:lnRef>
+          <a:fillRef idx="1">
+            <a:schemeClr val="accent1"/>
+          </a:fillRef>
+          <a:effectRef idx="0">
+            <a:schemeClr val="accent1"/>
+          </a:effectRef>
+          <a:fontRef idx="minor"/>
+        </p:style>
+      </p:sp>
+      <p:sp>
+        <p:nvSpPr>
+          <p:cNvPr id="7" name="TextShape 3">
+            <a:extLst>
+              <a:ext uri="{FF2B5EF4-FFF2-40B4-BE49-F238E27FC236}">
+                <a16:creationId xmlns:a16="http://schemas.microsoft.com/office/drawing/2014/main" id="{C085934D-B500-AC45-9EC1-005451DB1568}"/>
+              </a:ext>
+            </a:extLst>
+          </p:cNvPr>
+          <p:cNvSpPr txBox="1"/>
+          <p:nvPr/>
+        </p:nvSpPr>
+        <p:spPr>
+          <a:xfrm>
+            <a:off x="99360" y="2137892"/>
+            <a:ext cx="2221209" cy="2645247"/>
+          </a:xfrm>
+          <a:prstGeom prst="rect">
+            <a:avLst/>
+          </a:prstGeom>
+          <a:solidFill>
+            <a:srgbClr val="262626"/>
+          </a:solidFill>
+          <a:ln w="174600">
+            <a:solidFill>
+              <a:srgbClr val="262626"/>
+            </a:solidFill>
+            <a:round/>
+          </a:ln>
+        </p:spPr>
+        <p:txBody>
+          <a:bodyPr anchor="ctr">
+            <a:normAutofit/>
+          </a:bodyPr>
+          <a:lstStyle/>
+          <a:p>
+            <a:pPr algn="ctr">
               <a:lnSpc>
                 <a:spcPct val="90000"/>
               </a:lnSpc>
             </a:pPr>
             <a:r>
-              <a:rPr lang="en-US" sz="4400" b="0" strike="noStrike" spc="-1">
+              <a:rPr lang="en-US" sz="2600" b="0" strike="noStrike" spc="-1" dirty="0">
                 <a:solidFill>
-                  <a:srgbClr val="000000"/>
+                  <a:srgbClr val="FFFFFF"/>
                 </a:solidFill>
                 <a:latin typeface="Calibri Light"/>
               </a:rPr>
-              <a:t>Test:</a:t>
+              <a:t>Test Model</a:t>
             </a:r>
-            <a:endParaRPr lang="en-US" sz="4400" b="0" strike="noStrike" spc="-1">
-              <a:solidFill>
-                <a:srgbClr val="000000"/>
-              </a:solidFill>
-              <a:latin typeface="Calibri"/>
-            </a:endParaRPr>
-          </a:p>
-        </p:txBody>
-      </p:sp>
-      <p:sp>
-        <p:nvSpPr>
-          <p:cNvPr id="161" name="TextShape 2"/>
-          <p:cNvSpPr txBox="1"/>
-          <p:nvPr/>
-        </p:nvSpPr>
-        <p:spPr>
-          <a:xfrm>
-            <a:off x="838080" y="1825560"/>
-            <a:ext cx="10515240" cy="4350960"/>
-          </a:xfrm>
-          <a:prstGeom prst="rect">
-            <a:avLst/>
-          </a:prstGeom>
-          <a:noFill/>
-          <a:ln>
-            <a:noFill/>
-          </a:ln>
-        </p:spPr>
-        <p:txBody>
-          <a:bodyPr/>
-          <a:lstStyle/>
-          <a:p>
-            <a:endParaRPr lang="en-US" sz="2800" b="0" strike="noStrike" spc="-1">
+            <a:endParaRPr lang="en-US" sz="2600" b="0" strike="noStrike" spc="-1" dirty="0">
               <a:solidFill>
                 <a:srgbClr val="000000"/>
               </a:solidFill>
@@ -11457,8 +11553,8 @@
         </p:nvSpPr>
         <p:spPr>
           <a:xfrm>
-            <a:off x="831960" y="1709640"/>
-            <a:ext cx="10515240" cy="2852280"/>
+            <a:off x="831960" y="2745020"/>
+            <a:ext cx="10515240" cy="1367959"/>
           </a:xfrm>
           <a:prstGeom prst="rect">
             <a:avLst/>
@@ -11478,7 +11574,7 @@
               </a:lnSpc>
             </a:pPr>
             <a:r>
-              <a:rPr lang="en-US" sz="6000" b="0" strike="noStrike" spc="-1">
+              <a:rPr lang="en-US" sz="6000" b="0" strike="noStrike" spc="-1" dirty="0">
                 <a:solidFill>
                   <a:srgbClr val="000000"/>
                 </a:solidFill>
@@ -11486,7 +11582,7 @@
               </a:rPr>
               <a:t>Thanks!</a:t>
             </a:r>
-            <a:endParaRPr lang="en-US" sz="6000" b="0" strike="noStrike" spc="-1">
+            <a:endParaRPr lang="en-US" sz="6000" b="0" strike="noStrike" spc="-1" dirty="0">
               <a:solidFill>
                 <a:srgbClr val="000000"/>
               </a:solidFill>
@@ -13271,48 +13367,6 @@
       </p:sp>
       <p:sp>
         <p:nvSpPr>
-          <p:cNvPr id="4" name="CustomShape 1">
-            <a:extLst>
-              <a:ext uri="{FF2B5EF4-FFF2-40B4-BE49-F238E27FC236}">
-                <a16:creationId xmlns:a16="http://schemas.microsoft.com/office/drawing/2014/main" id="{FF4C2BDD-1168-644A-88E8-411B95347DAB}"/>
-              </a:ext>
-            </a:extLst>
-          </p:cNvPr>
-          <p:cNvSpPr/>
-          <p:nvPr/>
-        </p:nvSpPr>
-        <p:spPr>
-          <a:xfrm>
-            <a:off x="0" y="651600"/>
-            <a:ext cx="12191760" cy="736200"/>
-          </a:xfrm>
-          <a:prstGeom prst="rect">
-            <a:avLst/>
-          </a:prstGeom>
-          <a:solidFill>
-            <a:schemeClr val="tx1"/>
-          </a:solidFill>
-          <a:ln>
-            <a:noFill/>
-          </a:ln>
-        </p:spPr>
-        <p:style>
-          <a:lnRef idx="2">
-            <a:schemeClr val="accent1">
-              <a:shade val="50000"/>
-            </a:schemeClr>
-          </a:lnRef>
-          <a:fillRef idx="1">
-            <a:schemeClr val="accent1"/>
-          </a:fillRef>
-          <a:effectRef idx="0">
-            <a:schemeClr val="accent1"/>
-          </a:effectRef>
-          <a:fontRef idx="minor"/>
-        </p:style>
-      </p:sp>
-      <p:sp>
-        <p:nvSpPr>
           <p:cNvPr id="5" name="TextShape 2">
             <a:extLst>
               <a:ext uri="{FF2B5EF4-FFF2-40B4-BE49-F238E27FC236}">
@@ -13357,6 +13411,143 @@
               <a:t>Feature Vectors</a:t>
             </a:r>
             <a:endParaRPr lang="en-US" sz="3000" b="0" strike="noStrike" spc="-1" dirty="0">
+              <a:solidFill>
+                <a:srgbClr val="000000"/>
+              </a:solidFill>
+              <a:latin typeface="Calibri"/>
+            </a:endParaRPr>
+          </a:p>
+        </p:txBody>
+      </p:sp>
+      <p:pic>
+        <p:nvPicPr>
+          <p:cNvPr id="3" name="Picture 2" descr="A screenshot of a cell phone&#10;&#10;Description automatically generated">
+            <a:extLst>
+              <a:ext uri="{FF2B5EF4-FFF2-40B4-BE49-F238E27FC236}">
+                <a16:creationId xmlns:a16="http://schemas.microsoft.com/office/drawing/2014/main" id="{48B49B54-78F4-4A43-9668-A3217B8F51A2}"/>
+              </a:ext>
+            </a:extLst>
+          </p:cNvPr>
+          <p:cNvPicPr>
+            <a:picLocks noChangeAspect="1"/>
+          </p:cNvPicPr>
+          <p:nvPr/>
+        </p:nvPicPr>
+        <p:blipFill>
+          <a:blip r:embed="rId2">
+            <a:extLst>
+              <a:ext uri="{28A0092B-C50C-407E-A947-70E740481C1C}">
+                <a14:useLocalDpi xmlns:a14="http://schemas.microsoft.com/office/drawing/2010/main" val="0"/>
+              </a:ext>
+            </a:extLst>
+          </a:blip>
+          <a:stretch>
+            <a:fillRect/>
+          </a:stretch>
+        </p:blipFill>
+        <p:spPr>
+          <a:xfrm>
+            <a:off x="2916571" y="398752"/>
+            <a:ext cx="8718869" cy="6060134"/>
+          </a:xfrm>
+          <a:prstGeom prst="rect">
+            <a:avLst/>
+          </a:prstGeom>
+        </p:spPr>
+      </p:pic>
+      <p:sp>
+        <p:nvSpPr>
+          <p:cNvPr id="7" name="CustomShape 2">
+            <a:extLst>
+              <a:ext uri="{FF2B5EF4-FFF2-40B4-BE49-F238E27FC236}">
+                <a16:creationId xmlns:a16="http://schemas.microsoft.com/office/drawing/2014/main" id="{1D1CC7A4-921A-7547-A010-595740F5763E}"/>
+              </a:ext>
+            </a:extLst>
+          </p:cNvPr>
+          <p:cNvSpPr/>
+          <p:nvPr/>
+        </p:nvSpPr>
+        <p:spPr>
+          <a:xfrm>
+            <a:off x="0" y="0"/>
+            <a:ext cx="1532586" cy="6857640"/>
+          </a:xfrm>
+          <a:prstGeom prst="rect">
+            <a:avLst/>
+          </a:prstGeom>
+          <a:solidFill>
+            <a:srgbClr val="7F7F7F"/>
+          </a:solidFill>
+          <a:ln>
+            <a:noFill/>
+          </a:ln>
+        </p:spPr>
+        <p:style>
+          <a:lnRef idx="2">
+            <a:schemeClr val="accent1">
+              <a:shade val="50000"/>
+            </a:schemeClr>
+          </a:lnRef>
+          <a:fillRef idx="1">
+            <a:schemeClr val="accent1"/>
+          </a:fillRef>
+          <a:effectRef idx="0">
+            <a:schemeClr val="accent1"/>
+          </a:effectRef>
+          <a:fontRef idx="minor"/>
+        </p:style>
+      </p:sp>
+      <p:sp>
+        <p:nvSpPr>
+          <p:cNvPr id="8" name="TextShape 3">
+            <a:extLst>
+              <a:ext uri="{FF2B5EF4-FFF2-40B4-BE49-F238E27FC236}">
+                <a16:creationId xmlns:a16="http://schemas.microsoft.com/office/drawing/2014/main" id="{0AA06D84-98AA-D14E-9D7C-4EA5F21446C5}"/>
+              </a:ext>
+            </a:extLst>
+          </p:cNvPr>
+          <p:cNvSpPr txBox="1"/>
+          <p:nvPr/>
+        </p:nvSpPr>
+        <p:spPr>
+          <a:xfrm>
+            <a:off x="57257" y="2176940"/>
+            <a:ext cx="2167322" cy="2503759"/>
+          </a:xfrm>
+          <a:prstGeom prst="rect">
+            <a:avLst/>
+          </a:prstGeom>
+          <a:solidFill>
+            <a:srgbClr val="262626"/>
+          </a:solidFill>
+          <a:ln w="174600">
+            <a:solidFill>
+              <a:srgbClr val="262626"/>
+            </a:solidFill>
+            <a:round/>
+          </a:ln>
+        </p:spPr>
+        <p:txBody>
+          <a:bodyPr anchor="ctr">
+            <a:normAutofit/>
+          </a:bodyPr>
+          <a:lstStyle/>
+          <a:p>
+            <a:pPr algn="ctr">
+              <a:lnSpc>
+                <a:spcPct val="90000"/>
+              </a:lnSpc>
+            </a:pPr>
+            <a:r>
+              <a:rPr lang="en-US" sz="2600" b="0" strike="noStrike" spc="-1" dirty="0">
+                <a:solidFill>
+                  <a:srgbClr val="FFFFFF"/>
+                </a:solidFill>
+                <a:latin typeface="Calibri Light"/>
+              </a:rPr>
+              <a:t>Feature vectors</a:t>
+            </a:r>
+            <a:endParaRPr lang="en-US" sz="2600" b="0" strike="noStrike" spc="-1" dirty="0">
               <a:solidFill>
                 <a:srgbClr val="000000"/>
               </a:solidFill>

</xml_diff>